<commit_message>
MOTOMAN_UM_ver1.docx - spremenjene malenkosti (HURR DURR LETNICE DURR) MotomanPredstavitev.pptx - dodana poglavja Uvod, Opis problema, Opis simulatorja (začetek opisa Model robota)
</commit_message>
<xml_diff>
--- a/Robot_simulator/Dokumentacija/MotomanPredstavitev.pptx
+++ b/Robot_simulator/Dokumentacija/MotomanPredstavitev.pptx
@@ -5,16 +5,21 @@
     <p:sldMasterId id="2147483648" r:id="rId1"/>
   </p:sldMasterIdLst>
   <p:notesMasterIdLst>
-    <p:notesMasterId r:id="rId6"/>
+    <p:notesMasterId r:id="rId11"/>
   </p:notesMasterIdLst>
   <p:handoutMasterIdLst>
-    <p:handoutMasterId r:id="rId7"/>
+    <p:handoutMasterId r:id="rId12"/>
   </p:handoutMasterIdLst>
   <p:sldIdLst>
     <p:sldId id="256" r:id="rId2"/>
     <p:sldId id="283" r:id="rId3"/>
     <p:sldId id="270" r:id="rId4"/>
     <p:sldId id="284" r:id="rId5"/>
+    <p:sldId id="285" r:id="rId6"/>
+    <p:sldId id="286" r:id="rId7"/>
+    <p:sldId id="287" r:id="rId8"/>
+    <p:sldId id="288" r:id="rId9"/>
+    <p:sldId id="289" r:id="rId10"/>
   </p:sldIdLst>
   <p:sldSz cx="9144000" cy="6858000" type="screen4x3"/>
   <p:notesSz cx="6858000" cy="9144000"/>
@@ -948,6 +953,426 @@
               <a:rPr lang="en-US" smtClean="0"/>
               <a:pPr/>
               <a:t>4</a:t>
+            </a:fld>
+            <a:endParaRPr lang="en-US"/>
+          </a:p>
+        </p:txBody>
+      </p:sp>
+    </p:spTree>
+  </p:cSld>
+  <p:clrMapOvr>
+    <a:masterClrMapping/>
+  </p:clrMapOvr>
+</p:notes>
+</file>
+
+<file path=ppt/notesSlides/notesSlide5.xml><?xml version="1.0" encoding="utf-8"?>
+<p:notes xmlns:a="http://schemas.openxmlformats.org/drawingml/2006/main" xmlns:r="http://schemas.openxmlformats.org/officeDocument/2006/relationships" xmlns:p="http://schemas.openxmlformats.org/presentationml/2006/main">
+  <p:cSld>
+    <p:spTree>
+      <p:nvGrpSpPr>
+        <p:cNvPr id="1" name=""/>
+        <p:cNvGrpSpPr/>
+        <p:nvPr/>
+      </p:nvGrpSpPr>
+      <p:grpSpPr>
+        <a:xfrm>
+          <a:off x="0" y="0"/>
+          <a:ext cx="0" cy="0"/>
+          <a:chOff x="0" y="0"/>
+          <a:chExt cx="0" cy="0"/>
+        </a:xfrm>
+      </p:grpSpPr>
+      <p:sp>
+        <p:nvSpPr>
+          <p:cNvPr id="2" name="Rectangle 2"/>
+          <p:cNvSpPr>
+            <a:spLocks noGrp="1" noRot="1" noChangeAspect="1"/>
+          </p:cNvSpPr>
+          <p:nvPr>
+            <p:ph type="sldImg"/>
+          </p:nvPr>
+        </p:nvSpPr>
+        <p:spPr/>
+      </p:sp>
+      <p:sp>
+        <p:nvSpPr>
+          <p:cNvPr id="3" name="Rectangle 3"/>
+          <p:cNvSpPr>
+            <a:spLocks noGrp="1"/>
+          </p:cNvSpPr>
+          <p:nvPr>
+            <p:ph type="body" idx="1"/>
+          </p:nvPr>
+        </p:nvSpPr>
+        <p:spPr/>
+        <p:txBody>
+          <a:bodyPr/>
+          <a:lstStyle>
+            <a:extLst/>
+          </a:lstStyle>
+          <a:p>
+            <a:endParaRPr lang="en-US"/>
+          </a:p>
+        </p:txBody>
+      </p:sp>
+      <p:sp>
+        <p:nvSpPr>
+          <p:cNvPr id="4" name="Rectangle 4"/>
+          <p:cNvSpPr>
+            <a:spLocks noGrp="1"/>
+          </p:cNvSpPr>
+          <p:nvPr>
+            <p:ph type="sldNum" sz="quarter" idx="10"/>
+          </p:nvPr>
+        </p:nvSpPr>
+        <p:spPr/>
+        <p:txBody>
+          <a:bodyPr/>
+          <a:lstStyle>
+            <a:extLst/>
+          </a:lstStyle>
+          <a:p>
+            <a:fld id="{B3A019F3-8596-4028-9847-CBD3A185B07A}" type="slidenum">
+              <a:rPr lang="en-US" smtClean="0"/>
+              <a:pPr/>
+              <a:t>5</a:t>
+            </a:fld>
+            <a:endParaRPr lang="en-US"/>
+          </a:p>
+        </p:txBody>
+      </p:sp>
+    </p:spTree>
+  </p:cSld>
+  <p:clrMapOvr>
+    <a:masterClrMapping/>
+  </p:clrMapOvr>
+</p:notes>
+</file>
+
+<file path=ppt/notesSlides/notesSlide6.xml><?xml version="1.0" encoding="utf-8"?>
+<p:notes xmlns:a="http://schemas.openxmlformats.org/drawingml/2006/main" xmlns:r="http://schemas.openxmlformats.org/officeDocument/2006/relationships" xmlns:p="http://schemas.openxmlformats.org/presentationml/2006/main">
+  <p:cSld>
+    <p:spTree>
+      <p:nvGrpSpPr>
+        <p:cNvPr id="1" name=""/>
+        <p:cNvGrpSpPr/>
+        <p:nvPr/>
+      </p:nvGrpSpPr>
+      <p:grpSpPr>
+        <a:xfrm>
+          <a:off x="0" y="0"/>
+          <a:ext cx="0" cy="0"/>
+          <a:chOff x="0" y="0"/>
+          <a:chExt cx="0" cy="0"/>
+        </a:xfrm>
+      </p:grpSpPr>
+      <p:sp>
+        <p:nvSpPr>
+          <p:cNvPr id="2" name="Rectangle 2"/>
+          <p:cNvSpPr>
+            <a:spLocks noGrp="1" noRot="1" noChangeAspect="1"/>
+          </p:cNvSpPr>
+          <p:nvPr>
+            <p:ph type="sldImg"/>
+          </p:nvPr>
+        </p:nvSpPr>
+        <p:spPr/>
+      </p:sp>
+      <p:sp>
+        <p:nvSpPr>
+          <p:cNvPr id="3" name="Rectangle 3"/>
+          <p:cNvSpPr>
+            <a:spLocks noGrp="1"/>
+          </p:cNvSpPr>
+          <p:nvPr>
+            <p:ph type="body" idx="1"/>
+          </p:nvPr>
+        </p:nvSpPr>
+        <p:spPr/>
+        <p:txBody>
+          <a:bodyPr/>
+          <a:lstStyle>
+            <a:extLst/>
+          </a:lstStyle>
+          <a:p>
+            <a:endParaRPr lang="en-US"/>
+          </a:p>
+        </p:txBody>
+      </p:sp>
+      <p:sp>
+        <p:nvSpPr>
+          <p:cNvPr id="4" name="Rectangle 4"/>
+          <p:cNvSpPr>
+            <a:spLocks noGrp="1"/>
+          </p:cNvSpPr>
+          <p:nvPr>
+            <p:ph type="sldNum" sz="quarter" idx="10"/>
+          </p:nvPr>
+        </p:nvSpPr>
+        <p:spPr/>
+        <p:txBody>
+          <a:bodyPr/>
+          <a:lstStyle>
+            <a:extLst/>
+          </a:lstStyle>
+          <a:p>
+            <a:fld id="{B3A019F3-8596-4028-9847-CBD3A185B07A}" type="slidenum">
+              <a:rPr lang="en-US" smtClean="0"/>
+              <a:pPr/>
+              <a:t>6</a:t>
+            </a:fld>
+            <a:endParaRPr lang="en-US"/>
+          </a:p>
+        </p:txBody>
+      </p:sp>
+    </p:spTree>
+  </p:cSld>
+  <p:clrMapOvr>
+    <a:masterClrMapping/>
+  </p:clrMapOvr>
+</p:notes>
+</file>
+
+<file path=ppt/notesSlides/notesSlide7.xml><?xml version="1.0" encoding="utf-8"?>
+<p:notes xmlns:a="http://schemas.openxmlformats.org/drawingml/2006/main" xmlns:r="http://schemas.openxmlformats.org/officeDocument/2006/relationships" xmlns:p="http://schemas.openxmlformats.org/presentationml/2006/main">
+  <p:cSld>
+    <p:spTree>
+      <p:nvGrpSpPr>
+        <p:cNvPr id="1" name=""/>
+        <p:cNvGrpSpPr/>
+        <p:nvPr/>
+      </p:nvGrpSpPr>
+      <p:grpSpPr>
+        <a:xfrm>
+          <a:off x="0" y="0"/>
+          <a:ext cx="0" cy="0"/>
+          <a:chOff x="0" y="0"/>
+          <a:chExt cx="0" cy="0"/>
+        </a:xfrm>
+      </p:grpSpPr>
+      <p:sp>
+        <p:nvSpPr>
+          <p:cNvPr id="2" name="Rectangle 2"/>
+          <p:cNvSpPr>
+            <a:spLocks noGrp="1" noRot="1" noChangeAspect="1"/>
+          </p:cNvSpPr>
+          <p:nvPr>
+            <p:ph type="sldImg"/>
+          </p:nvPr>
+        </p:nvSpPr>
+        <p:spPr/>
+      </p:sp>
+      <p:sp>
+        <p:nvSpPr>
+          <p:cNvPr id="3" name="Rectangle 3"/>
+          <p:cNvSpPr>
+            <a:spLocks noGrp="1"/>
+          </p:cNvSpPr>
+          <p:nvPr>
+            <p:ph type="body" idx="1"/>
+          </p:nvPr>
+        </p:nvSpPr>
+        <p:spPr/>
+        <p:txBody>
+          <a:bodyPr/>
+          <a:lstStyle>
+            <a:extLst/>
+          </a:lstStyle>
+          <a:p>
+            <a:endParaRPr lang="en-US"/>
+          </a:p>
+        </p:txBody>
+      </p:sp>
+      <p:sp>
+        <p:nvSpPr>
+          <p:cNvPr id="4" name="Rectangle 4"/>
+          <p:cNvSpPr>
+            <a:spLocks noGrp="1"/>
+          </p:cNvSpPr>
+          <p:nvPr>
+            <p:ph type="sldNum" sz="quarter" idx="10"/>
+          </p:nvPr>
+        </p:nvSpPr>
+        <p:spPr/>
+        <p:txBody>
+          <a:bodyPr/>
+          <a:lstStyle>
+            <a:extLst/>
+          </a:lstStyle>
+          <a:p>
+            <a:fld id="{B3A019F3-8596-4028-9847-CBD3A185B07A}" type="slidenum">
+              <a:rPr lang="en-US" smtClean="0"/>
+              <a:pPr/>
+              <a:t>7</a:t>
+            </a:fld>
+            <a:endParaRPr lang="en-US"/>
+          </a:p>
+        </p:txBody>
+      </p:sp>
+    </p:spTree>
+  </p:cSld>
+  <p:clrMapOvr>
+    <a:masterClrMapping/>
+  </p:clrMapOvr>
+</p:notes>
+</file>
+
+<file path=ppt/notesSlides/notesSlide8.xml><?xml version="1.0" encoding="utf-8"?>
+<p:notes xmlns:a="http://schemas.openxmlformats.org/drawingml/2006/main" xmlns:r="http://schemas.openxmlformats.org/officeDocument/2006/relationships" xmlns:p="http://schemas.openxmlformats.org/presentationml/2006/main">
+  <p:cSld>
+    <p:spTree>
+      <p:nvGrpSpPr>
+        <p:cNvPr id="1" name=""/>
+        <p:cNvGrpSpPr/>
+        <p:nvPr/>
+      </p:nvGrpSpPr>
+      <p:grpSpPr>
+        <a:xfrm>
+          <a:off x="0" y="0"/>
+          <a:ext cx="0" cy="0"/>
+          <a:chOff x="0" y="0"/>
+          <a:chExt cx="0" cy="0"/>
+        </a:xfrm>
+      </p:grpSpPr>
+      <p:sp>
+        <p:nvSpPr>
+          <p:cNvPr id="2" name="Rectangle 2"/>
+          <p:cNvSpPr>
+            <a:spLocks noGrp="1" noRot="1" noChangeAspect="1"/>
+          </p:cNvSpPr>
+          <p:nvPr>
+            <p:ph type="sldImg"/>
+          </p:nvPr>
+        </p:nvSpPr>
+        <p:spPr/>
+      </p:sp>
+      <p:sp>
+        <p:nvSpPr>
+          <p:cNvPr id="3" name="Rectangle 3"/>
+          <p:cNvSpPr>
+            <a:spLocks noGrp="1"/>
+          </p:cNvSpPr>
+          <p:nvPr>
+            <p:ph type="body" idx="1"/>
+          </p:nvPr>
+        </p:nvSpPr>
+        <p:spPr/>
+        <p:txBody>
+          <a:bodyPr/>
+          <a:lstStyle>
+            <a:extLst/>
+          </a:lstStyle>
+          <a:p>
+            <a:endParaRPr lang="en-US"/>
+          </a:p>
+        </p:txBody>
+      </p:sp>
+      <p:sp>
+        <p:nvSpPr>
+          <p:cNvPr id="4" name="Rectangle 4"/>
+          <p:cNvSpPr>
+            <a:spLocks noGrp="1"/>
+          </p:cNvSpPr>
+          <p:nvPr>
+            <p:ph type="sldNum" sz="quarter" idx="10"/>
+          </p:nvPr>
+        </p:nvSpPr>
+        <p:spPr/>
+        <p:txBody>
+          <a:bodyPr/>
+          <a:lstStyle>
+            <a:extLst/>
+          </a:lstStyle>
+          <a:p>
+            <a:fld id="{B3A019F3-8596-4028-9847-CBD3A185B07A}" type="slidenum">
+              <a:rPr lang="en-US" smtClean="0"/>
+              <a:pPr/>
+              <a:t>8</a:t>
+            </a:fld>
+            <a:endParaRPr lang="en-US"/>
+          </a:p>
+        </p:txBody>
+      </p:sp>
+    </p:spTree>
+  </p:cSld>
+  <p:clrMapOvr>
+    <a:masterClrMapping/>
+  </p:clrMapOvr>
+</p:notes>
+</file>
+
+<file path=ppt/notesSlides/notesSlide9.xml><?xml version="1.0" encoding="utf-8"?>
+<p:notes xmlns:a="http://schemas.openxmlformats.org/drawingml/2006/main" xmlns:r="http://schemas.openxmlformats.org/officeDocument/2006/relationships" xmlns:p="http://schemas.openxmlformats.org/presentationml/2006/main">
+  <p:cSld>
+    <p:spTree>
+      <p:nvGrpSpPr>
+        <p:cNvPr id="1" name=""/>
+        <p:cNvGrpSpPr/>
+        <p:nvPr/>
+      </p:nvGrpSpPr>
+      <p:grpSpPr>
+        <a:xfrm>
+          <a:off x="0" y="0"/>
+          <a:ext cx="0" cy="0"/>
+          <a:chOff x="0" y="0"/>
+          <a:chExt cx="0" cy="0"/>
+        </a:xfrm>
+      </p:grpSpPr>
+      <p:sp>
+        <p:nvSpPr>
+          <p:cNvPr id="2" name="Rectangle 2"/>
+          <p:cNvSpPr>
+            <a:spLocks noGrp="1" noRot="1" noChangeAspect="1"/>
+          </p:cNvSpPr>
+          <p:nvPr>
+            <p:ph type="sldImg"/>
+          </p:nvPr>
+        </p:nvSpPr>
+        <p:spPr/>
+      </p:sp>
+      <p:sp>
+        <p:nvSpPr>
+          <p:cNvPr id="3" name="Rectangle 3"/>
+          <p:cNvSpPr>
+            <a:spLocks noGrp="1"/>
+          </p:cNvSpPr>
+          <p:nvPr>
+            <p:ph type="body" idx="1"/>
+          </p:nvPr>
+        </p:nvSpPr>
+        <p:spPr/>
+        <p:txBody>
+          <a:bodyPr/>
+          <a:lstStyle>
+            <a:extLst/>
+          </a:lstStyle>
+          <a:p>
+            <a:endParaRPr lang="en-US"/>
+          </a:p>
+        </p:txBody>
+      </p:sp>
+      <p:sp>
+        <p:nvSpPr>
+          <p:cNvPr id="4" name="Rectangle 4"/>
+          <p:cNvSpPr>
+            <a:spLocks noGrp="1"/>
+          </p:cNvSpPr>
+          <p:nvPr>
+            <p:ph type="sldNum" sz="quarter" idx="10"/>
+          </p:nvPr>
+        </p:nvSpPr>
+        <p:spPr/>
+        <p:txBody>
+          <a:bodyPr/>
+          <a:lstStyle>
+            <a:extLst/>
+          </a:lstStyle>
+          <a:p>
+            <a:fld id="{B3A019F3-8596-4028-9847-CBD3A185B07A}" type="slidenum">
+              <a:rPr lang="en-US" smtClean="0"/>
+              <a:pPr/>
+              <a:t>9</a:t>
             </a:fld>
             <a:endParaRPr lang="en-US"/>
           </a:p>
@@ -8931,6 +9356,131 @@
           </a:xfrm>
         </p:spPr>
       </p:pic>
+      <p:sp>
+        <p:nvSpPr>
+          <p:cNvPr id="25" name="Rectangle 4"/>
+          <p:cNvSpPr>
+            <a:spLocks noGrp="1"/>
+          </p:cNvSpPr>
+          <p:nvPr>
+            <p:ph sz="quarter" idx="15"/>
+          </p:nvPr>
+        </p:nvSpPr>
+        <p:spPr>
+          <a:xfrm>
+            <a:off x="323528" y="1052736"/>
+            <a:ext cx="8074152" cy="5544616"/>
+          </a:xfrm>
+        </p:spPr>
+        <p:txBody>
+          <a:bodyPr>
+            <a:normAutofit/>
+          </a:bodyPr>
+          <a:lstStyle>
+            <a:extLst/>
+          </a:lstStyle>
+          <a:p>
+            <a:pPr marL="342900" marR="0" indent="-342900" algn="l" rtl="0" latinLnBrk="0">
+              <a:spcBef>
+                <a:spcPct val="20000"/>
+              </a:spcBef>
+              <a:buFont typeface="+mj-lt"/>
+              <a:buAutoNum type="arabicPeriod"/>
+            </a:pPr>
+            <a:r>
+              <a:rPr lang="sl-SI" sz="1800" dirty="0" smtClean="0"/>
+              <a:t>Uvod</a:t>
+            </a:r>
+          </a:p>
+          <a:p>
+            <a:pPr marL="342900" marR="0" indent="-342900" algn="l" rtl="0" latinLnBrk="0">
+              <a:spcBef>
+                <a:spcPct val="20000"/>
+              </a:spcBef>
+              <a:buFont typeface="+mj-lt"/>
+              <a:buAutoNum type="arabicPeriod"/>
+            </a:pPr>
+            <a:r>
+              <a:rPr lang="sl-SI" sz="1800" dirty="0" smtClean="0"/>
+              <a:t>Predstavitev problema</a:t>
+            </a:r>
+          </a:p>
+          <a:p>
+            <a:pPr marL="342900" marR="0" indent="-342900" algn="l" rtl="0" latinLnBrk="0">
+              <a:spcBef>
+                <a:spcPct val="20000"/>
+              </a:spcBef>
+              <a:buFont typeface="+mj-lt"/>
+              <a:buAutoNum type="arabicPeriod"/>
+            </a:pPr>
+            <a:r>
+              <a:rPr lang="sl-SI" sz="1800" dirty="0" smtClean="0"/>
+              <a:t>Opis simulatorja</a:t>
+            </a:r>
+          </a:p>
+          <a:p>
+            <a:pPr marL="1085850" lvl="1" indent="-342900">
+              <a:buFont typeface="Arial" pitchFamily="34" charset="0"/>
+              <a:buChar char="•"/>
+            </a:pPr>
+            <a:r>
+              <a:rPr lang="sl-SI" sz="1800" dirty="0" smtClean="0"/>
+              <a:t>Model robota</a:t>
+            </a:r>
+          </a:p>
+          <a:p>
+            <a:pPr marL="1085850" lvl="1" indent="-342900">
+              <a:buFont typeface="Arial" pitchFamily="34" charset="0"/>
+              <a:buChar char="•"/>
+            </a:pPr>
+            <a:r>
+              <a:rPr lang="sl-SI" sz="1800" dirty="0" smtClean="0"/>
+              <a:t>Rezkar</a:t>
+            </a:r>
+          </a:p>
+          <a:p>
+            <a:pPr marL="1085850" lvl="1" indent="-342900">
+              <a:buFont typeface="Arial" pitchFamily="34" charset="0"/>
+              <a:buChar char="•"/>
+            </a:pPr>
+            <a:r>
+              <a:rPr lang="sl-SI" sz="1800" dirty="0" smtClean="0"/>
+              <a:t>„Jezik“ robota</a:t>
+            </a:r>
+          </a:p>
+          <a:p>
+            <a:pPr marL="1085850" lvl="1" indent="-342900">
+              <a:buFont typeface="Arial" pitchFamily="34" charset="0"/>
+              <a:buChar char="•"/>
+            </a:pPr>
+            <a:r>
+              <a:rPr lang="sl-SI" sz="1800" dirty="0" smtClean="0"/>
+              <a:t>Zunanji koordinatni sistem</a:t>
+            </a:r>
+            <a:endParaRPr lang="sl-SI" sz="1800" dirty="0"/>
+          </a:p>
+          <a:p>
+            <a:pPr marL="342900" indent="-342900">
+              <a:buFont typeface="+mj-lt"/>
+              <a:buAutoNum type="arabicPeriod"/>
+            </a:pPr>
+            <a:r>
+              <a:rPr lang="sl-SI" sz="1800" dirty="0" smtClean="0"/>
+              <a:t>Predstavitev orodja</a:t>
+            </a:r>
+          </a:p>
+          <a:p>
+            <a:pPr marL="342900" indent="-342900">
+              <a:buFont typeface="+mj-lt"/>
+              <a:buAutoNum type="arabicPeriod"/>
+            </a:pPr>
+            <a:r>
+              <a:rPr lang="sl-SI" sz="1800" dirty="0" smtClean="0"/>
+              <a:t>Zaključek</a:t>
+            </a:r>
+          </a:p>
+        </p:txBody>
+      </p:sp>
     </p:spTree>
   </p:cSld>
   <p:clrMapOvr>
@@ -8981,8 +9531,12 @@
           </a:lstStyle>
           <a:p>
             <a:r>
-              <a:rPr lang="en-US" dirty="0" smtClean="0"/>
-              <a:t>Sample Slides</a:t>
+              <a:rPr lang="sl-SI" dirty="0" smtClean="0"/>
+              <a:t>1. </a:t>
+            </a:r>
+            <a:r>
+              <a:rPr lang="sl-SI" dirty="0" smtClean="0"/>
+              <a:t>Uvod</a:t>
             </a:r>
             <a:endParaRPr lang="en-US" dirty="0"/>
           </a:p>
@@ -9012,6 +9566,36 @@
           <a:xfrm>
             <a:off x="6660232" y="5301208"/>
             <a:ext cx="2352307" cy="1470192"/>
+          </a:xfrm>
+          <a:prstGeom prst="rect">
+            <a:avLst/>
+          </a:prstGeom>
+        </p:spPr>
+      </p:pic>
+      <p:pic>
+        <p:nvPicPr>
+          <p:cNvPr id="5" name="Picture 4"/>
+          <p:cNvPicPr>
+            <a:picLocks noChangeAspect="1"/>
+          </p:cNvPicPr>
+          <p:nvPr/>
+        </p:nvPicPr>
+        <p:blipFill>
+          <a:blip r:embed="rId4" cstate="print">
+            <a:extLst>
+              <a:ext uri="{28A0092B-C50C-407E-A947-70E740481C1C}">
+                <a14:useLocalDpi xmlns:a14="http://schemas.microsoft.com/office/drawing/2010/main" val="0"/>
+              </a:ext>
+            </a:extLst>
+          </a:blip>
+          <a:stretch>
+            <a:fillRect/>
+          </a:stretch>
+        </p:blipFill>
+        <p:spPr>
+          <a:xfrm>
+            <a:off x="1835696" y="260648"/>
+            <a:ext cx="5544616" cy="3603000"/>
           </a:xfrm>
           <a:prstGeom prst="rect">
             <a:avLst/>
@@ -9071,7 +9655,7 @@
           <a:p>
             <a:r>
               <a:rPr lang="sl-SI" dirty="0" smtClean="0"/>
-              <a:t>Struktura predstavitve</a:t>
+              <a:t>Uvod</a:t>
             </a:r>
             <a:endParaRPr lang="en-US" dirty="0"/>
           </a:p>
@@ -9102,8 +9686,8 @@
           </a:lstStyle>
           <a:p>
             <a:r>
-              <a:rPr lang="sl-SI" sz="3600" dirty="0" smtClean="0"/>
-              <a:t>Vsebina</a:t>
+              <a:rPr lang="sl-SI" sz="3600" dirty="0" err="1" smtClean="0"/>
+              <a:t>JRobSim</a:t>
             </a:r>
             <a:endParaRPr lang="en-US" sz="3600" dirty="0"/>
           </a:p>
@@ -9138,10 +9722,1061 @@
           </a:xfrm>
         </p:spPr>
       </p:pic>
+      <p:sp>
+        <p:nvSpPr>
+          <p:cNvPr id="5" name="Rectangle 4"/>
+          <p:cNvSpPr>
+            <a:spLocks noGrp="1"/>
+          </p:cNvSpPr>
+          <p:nvPr>
+            <p:ph sz="quarter" idx="15"/>
+          </p:nvPr>
+        </p:nvSpPr>
+        <p:spPr>
+          <a:xfrm>
+            <a:off x="323528" y="1052736"/>
+            <a:ext cx="8074152" cy="5544616"/>
+          </a:xfrm>
+        </p:spPr>
+        <p:txBody>
+          <a:bodyPr>
+            <a:normAutofit/>
+          </a:bodyPr>
+          <a:lstStyle>
+            <a:extLst/>
+          </a:lstStyle>
+          <a:p>
+            <a:pPr marL="342900" marR="0" indent="-342900" algn="l" rtl="0" latinLnBrk="0">
+              <a:spcBef>
+                <a:spcPct val="20000"/>
+              </a:spcBef>
+              <a:buFont typeface="Arial" pitchFamily="34" charset="0"/>
+              <a:buChar char="•"/>
+            </a:pPr>
+            <a:r>
+              <a:rPr lang="sl-SI" sz="1800" dirty="0" smtClean="0"/>
+              <a:t>V razvoju že več let</a:t>
+            </a:r>
+          </a:p>
+          <a:p>
+            <a:pPr marL="342900" marR="0" indent="-342900" algn="l" rtl="0" latinLnBrk="0">
+              <a:spcBef>
+                <a:spcPct val="20000"/>
+              </a:spcBef>
+              <a:buFont typeface="Arial" pitchFamily="34" charset="0"/>
+              <a:buChar char="•"/>
+            </a:pPr>
+            <a:r>
+              <a:rPr lang="sl-SI" sz="1800" dirty="0" smtClean="0"/>
+              <a:t>Razvoj potekal v razvojnem okolju </a:t>
+            </a:r>
+            <a:r>
+              <a:rPr lang="sl-SI" sz="1800" dirty="0" err="1" smtClean="0"/>
+              <a:t>NetBeans</a:t>
+            </a:r>
+            <a:r>
+              <a:rPr lang="sl-SI" sz="1800" dirty="0" smtClean="0"/>
+              <a:t> v Javi</a:t>
+            </a:r>
+          </a:p>
+          <a:p>
+            <a:pPr marL="342900" indent="-342900">
+              <a:buFont typeface="Arial" pitchFamily="34" charset="0"/>
+              <a:buChar char="•"/>
+            </a:pPr>
+            <a:r>
+              <a:rPr lang="sl-SI" sz="1800" dirty="0"/>
+              <a:t>S</a:t>
+            </a:r>
+            <a:r>
+              <a:rPr lang="sl-SI" sz="1800" dirty="0" smtClean="0"/>
+              <a:t>e </a:t>
+            </a:r>
+            <a:r>
+              <a:rPr lang="sl-SI" sz="1800" dirty="0"/>
+              <a:t>uporablja kot pripomoček pri simuliranju, gradnji in opazovanju gibanja različnih tipov </a:t>
+            </a:r>
+            <a:r>
+              <a:rPr lang="sl-SI" sz="1800" dirty="0" smtClean="0"/>
+              <a:t>robotov</a:t>
+            </a:r>
+          </a:p>
+          <a:p>
+            <a:pPr marL="342900" indent="-342900">
+              <a:buFont typeface="Arial" pitchFamily="34" charset="0"/>
+              <a:buChar char="•"/>
+            </a:pPr>
+            <a:r>
+              <a:rPr lang="sl-SI" sz="1800" dirty="0" smtClean="0"/>
+              <a:t>Razširjanje  funkcionalnosti skozi leta</a:t>
+            </a:r>
+          </a:p>
+          <a:p>
+            <a:pPr marL="342900" indent="-342900">
+              <a:buFont typeface="Arial" pitchFamily="34" charset="0"/>
+              <a:buChar char="•"/>
+            </a:pPr>
+            <a:r>
+              <a:rPr lang="sl-SI" sz="1800" dirty="0"/>
+              <a:t>Namenjena je </a:t>
+            </a:r>
+            <a:r>
+              <a:rPr lang="sl-SI" sz="1800" dirty="0" smtClean="0"/>
+              <a:t>študentom</a:t>
+            </a:r>
+            <a:r>
+              <a:rPr lang="sl-SI" sz="1800" dirty="0"/>
+              <a:t>, profesorjem </a:t>
+            </a:r>
+            <a:r>
+              <a:rPr lang="sl-SI" sz="1800" dirty="0" smtClean="0"/>
+              <a:t>in ostalim </a:t>
+            </a:r>
+            <a:r>
+              <a:rPr lang="sl-SI" sz="1800" dirty="0"/>
+              <a:t>uporabnikom, ki imajo interesne sfere v </a:t>
+            </a:r>
+            <a:r>
+              <a:rPr lang="sl-SI" sz="1800" dirty="0" smtClean="0"/>
+              <a:t>robotizaciji</a:t>
+            </a:r>
+            <a:endParaRPr lang="sl-SI" sz="1800" dirty="0" smtClean="0"/>
+          </a:p>
+        </p:txBody>
+      </p:sp>
     </p:spTree>
     <p:extLst>
       <p:ext uri="{BB962C8B-B14F-4D97-AF65-F5344CB8AC3E}">
         <p14:creationId xmlns:p14="http://schemas.microsoft.com/office/powerpoint/2010/main" val="1969461706"/>
+      </p:ext>
+    </p:extLst>
+  </p:cSld>
+  <p:clrMapOvr>
+    <a:masterClrMapping/>
+  </p:clrMapOvr>
+  <p:timing>
+    <p:tnLst>
+      <p:par>
+        <p:cTn id="1" dur="indefinite" restart="never" nodeType="tmRoot"/>
+      </p:par>
+    </p:tnLst>
+  </p:timing>
+</p:sld>
+</file>
+
+<file path=ppt/slides/slide5.xml><?xml version="1.0" encoding="utf-8"?>
+<p:sld xmlns:a="http://schemas.openxmlformats.org/drawingml/2006/main" xmlns:r="http://schemas.openxmlformats.org/officeDocument/2006/relationships" xmlns:p="http://schemas.openxmlformats.org/presentationml/2006/main">
+  <p:cSld>
+    <p:spTree>
+      <p:nvGrpSpPr>
+        <p:cNvPr id="1" name=""/>
+        <p:cNvGrpSpPr/>
+        <p:nvPr/>
+      </p:nvGrpSpPr>
+      <p:grpSpPr>
+        <a:xfrm>
+          <a:off x="0" y="0"/>
+          <a:ext cx="0" cy="0"/>
+          <a:chOff x="0" y="0"/>
+          <a:chExt cx="0" cy="0"/>
+        </a:xfrm>
+      </p:grpSpPr>
+      <p:sp>
+        <p:nvSpPr>
+          <p:cNvPr id="29" name="Rectangle 2"/>
+          <p:cNvSpPr>
+            <a:spLocks noGrp="1"/>
+          </p:cNvSpPr>
+          <p:nvPr>
+            <p:ph type="title"/>
+          </p:nvPr>
+        </p:nvSpPr>
+        <p:spPr/>
+        <p:txBody>
+          <a:bodyPr>
+            <a:normAutofit fontScale="90000"/>
+          </a:bodyPr>
+          <a:lstStyle>
+            <a:extLst/>
+          </a:lstStyle>
+          <a:p>
+            <a:r>
+              <a:rPr lang="sl-SI" dirty="0" smtClean="0"/>
+              <a:t>Uvod</a:t>
+            </a:r>
+            <a:endParaRPr lang="en-US" dirty="0"/>
+          </a:p>
+        </p:txBody>
+      </p:sp>
+      <p:sp>
+        <p:nvSpPr>
+          <p:cNvPr id="2" name="Rectangle 3"/>
+          <p:cNvSpPr>
+            <a:spLocks noGrp="1"/>
+          </p:cNvSpPr>
+          <p:nvPr>
+            <p:ph type="body" sz="quarter" idx="13"/>
+          </p:nvPr>
+        </p:nvSpPr>
+        <p:spPr>
+          <a:xfrm>
+            <a:off x="304800" y="381000"/>
+            <a:ext cx="8077200" cy="599728"/>
+          </a:xfrm>
+        </p:spPr>
+        <p:txBody>
+          <a:bodyPr>
+            <a:noAutofit/>
+          </a:bodyPr>
+          <a:lstStyle>
+            <a:extLst/>
+          </a:lstStyle>
+          <a:p>
+            <a:r>
+              <a:rPr lang="sl-SI" sz="3600" dirty="0" err="1" smtClean="0"/>
+              <a:t>Motoman</a:t>
+            </a:r>
+            <a:r>
+              <a:rPr lang="sl-SI" sz="3600" dirty="0" smtClean="0"/>
+              <a:t> .NET</a:t>
+            </a:r>
+            <a:endParaRPr lang="en-US" sz="3600" dirty="0"/>
+          </a:p>
+        </p:txBody>
+      </p:sp>
+      <p:pic>
+        <p:nvPicPr>
+          <p:cNvPr id="12" name="Content Placeholder 11"/>
+          <p:cNvPicPr>
+            <a:picLocks noGrp="1" noChangeAspect="1"/>
+          </p:cNvPicPr>
+          <p:nvPr>
+            <p:ph sz="quarter" idx="15"/>
+          </p:nvPr>
+        </p:nvPicPr>
+        <p:blipFill>
+          <a:blip r:embed="rId3" cstate="print">
+            <a:extLst>
+              <a:ext uri="{28A0092B-C50C-407E-A947-70E740481C1C}">
+                <a14:useLocalDpi xmlns:a14="http://schemas.microsoft.com/office/drawing/2010/main" val="0"/>
+              </a:ext>
+            </a:extLst>
+          </a:blip>
+          <a:stretch>
+            <a:fillRect/>
+          </a:stretch>
+        </p:blipFill>
+        <p:spPr>
+          <a:xfrm>
+            <a:off x="6180133" y="5343184"/>
+            <a:ext cx="2352307" cy="1470192"/>
+          </a:xfrm>
+        </p:spPr>
+      </p:pic>
+      <p:sp>
+        <p:nvSpPr>
+          <p:cNvPr id="5" name="Rectangle 4"/>
+          <p:cNvSpPr>
+            <a:spLocks noGrp="1"/>
+          </p:cNvSpPr>
+          <p:nvPr>
+            <p:ph sz="quarter" idx="15"/>
+          </p:nvPr>
+        </p:nvSpPr>
+        <p:spPr>
+          <a:xfrm>
+            <a:off x="323528" y="1052736"/>
+            <a:ext cx="8074152" cy="5544616"/>
+          </a:xfrm>
+        </p:spPr>
+        <p:txBody>
+          <a:bodyPr>
+            <a:normAutofit/>
+          </a:bodyPr>
+          <a:lstStyle>
+            <a:extLst/>
+          </a:lstStyle>
+          <a:p>
+            <a:pPr marL="342900" marR="0" indent="-342900" algn="l" rtl="0" latinLnBrk="0">
+              <a:spcBef>
+                <a:spcPct val="20000"/>
+              </a:spcBef>
+              <a:buFont typeface="Arial" pitchFamily="34" charset="0"/>
+              <a:buChar char="•"/>
+            </a:pPr>
+            <a:r>
+              <a:rPr lang="sl-SI" sz="1800" dirty="0" smtClean="0"/>
+              <a:t>Povzame obstoječe funkcionalnosti iz </a:t>
+            </a:r>
+            <a:r>
+              <a:rPr lang="sl-SI" sz="1800" dirty="0" err="1" smtClean="0"/>
+              <a:t>JRobSim</a:t>
+            </a:r>
+            <a:r>
+              <a:rPr lang="sl-SI" sz="1800" dirty="0" smtClean="0"/>
+              <a:t> </a:t>
+            </a:r>
+          </a:p>
+          <a:p>
+            <a:pPr marL="342900" marR="0" indent="-342900" algn="l" rtl="0" latinLnBrk="0">
+              <a:spcBef>
+                <a:spcPct val="20000"/>
+              </a:spcBef>
+              <a:buFont typeface="Arial" pitchFamily="34" charset="0"/>
+              <a:buChar char="•"/>
+            </a:pPr>
+            <a:r>
+              <a:rPr lang="sl-SI" sz="1800" dirty="0" smtClean="0"/>
+              <a:t>Implementacija v ogrodju .NET</a:t>
+            </a:r>
+          </a:p>
+          <a:p>
+            <a:pPr marL="342900" marR="0" indent="-342900" algn="l" rtl="0" latinLnBrk="0">
+              <a:spcBef>
+                <a:spcPct val="20000"/>
+              </a:spcBef>
+              <a:buFont typeface="Arial" pitchFamily="34" charset="0"/>
+              <a:buChar char="•"/>
+            </a:pPr>
+            <a:r>
+              <a:rPr lang="sl-SI" sz="1800" dirty="0" smtClean="0"/>
+              <a:t>Razvojna orodja</a:t>
+            </a:r>
+          </a:p>
+          <a:p>
+            <a:pPr marL="1085850" lvl="1" indent="-342900">
+              <a:buFont typeface="Arial" pitchFamily="34" charset="0"/>
+              <a:buChar char="•"/>
+            </a:pPr>
+            <a:r>
+              <a:rPr lang="sl-SI" sz="1800" dirty="0" err="1" smtClean="0"/>
+              <a:t>Visual</a:t>
+            </a:r>
+            <a:r>
+              <a:rPr lang="sl-SI" sz="1800" dirty="0" smtClean="0"/>
+              <a:t> Studio 2010</a:t>
+            </a:r>
+          </a:p>
+          <a:p>
+            <a:pPr marL="1085850" lvl="1" indent="-342900">
+              <a:buFont typeface="Arial" pitchFamily="34" charset="0"/>
+              <a:buChar char="•"/>
+            </a:pPr>
+            <a:r>
+              <a:rPr lang="sl-SI" sz="1800" dirty="0" err="1" smtClean="0"/>
+              <a:t>ANTLRWorks</a:t>
+            </a:r>
+            <a:endParaRPr lang="sl-SI" sz="1800" dirty="0" smtClean="0"/>
+          </a:p>
+          <a:p>
+            <a:pPr marL="1085850" lvl="1" indent="-342900">
+              <a:buFont typeface="Arial" pitchFamily="34" charset="0"/>
+              <a:buChar char="•"/>
+            </a:pPr>
+            <a:r>
+              <a:rPr lang="sl-SI" sz="1800" dirty="0" err="1" smtClean="0"/>
+              <a:t>LightWave</a:t>
+            </a:r>
+            <a:endParaRPr lang="sl-SI" sz="1800" dirty="0" smtClean="0"/>
+          </a:p>
+          <a:p>
+            <a:pPr marL="342900" indent="-342900">
+              <a:buFont typeface="Arial" pitchFamily="34" charset="0"/>
+              <a:buChar char="•"/>
+            </a:pPr>
+            <a:r>
+              <a:rPr lang="sl-SI" sz="1800" dirty="0" smtClean="0"/>
+              <a:t>Uporabljene tehnologije: programski jezik C#, knjižnica </a:t>
+            </a:r>
+            <a:r>
+              <a:rPr lang="sl-SI" sz="1800" dirty="0" err="1" smtClean="0"/>
+              <a:t>OpenTK</a:t>
+            </a:r>
+            <a:r>
+              <a:rPr lang="sl-SI" sz="1800" dirty="0" smtClean="0"/>
+              <a:t> (</a:t>
+            </a:r>
+            <a:r>
+              <a:rPr lang="sl-SI" sz="1800" dirty="0" err="1" smtClean="0"/>
+              <a:t>OpenGL</a:t>
+            </a:r>
+            <a:r>
+              <a:rPr lang="sl-SI" sz="1800" dirty="0" smtClean="0"/>
+              <a:t>)</a:t>
+            </a:r>
+          </a:p>
+        </p:txBody>
+      </p:sp>
+    </p:spTree>
+    <p:extLst>
+      <p:ext uri="{BB962C8B-B14F-4D97-AF65-F5344CB8AC3E}">
+        <p14:creationId xmlns:p14="http://schemas.microsoft.com/office/powerpoint/2010/main" val="2395877713"/>
+      </p:ext>
+    </p:extLst>
+  </p:cSld>
+  <p:clrMapOvr>
+    <a:masterClrMapping/>
+  </p:clrMapOvr>
+  <p:timing>
+    <p:tnLst>
+      <p:par>
+        <p:cTn id="1" dur="indefinite" restart="never" nodeType="tmRoot"/>
+      </p:par>
+    </p:tnLst>
+  </p:timing>
+</p:sld>
+</file>
+
+<file path=ppt/slides/slide6.xml><?xml version="1.0" encoding="utf-8"?>
+<p:sld xmlns:a="http://schemas.openxmlformats.org/drawingml/2006/main" xmlns:r="http://schemas.openxmlformats.org/officeDocument/2006/relationships" xmlns:p="http://schemas.openxmlformats.org/presentationml/2006/main">
+  <p:cSld>
+    <p:spTree>
+      <p:nvGrpSpPr>
+        <p:cNvPr id="1" name=""/>
+        <p:cNvGrpSpPr/>
+        <p:nvPr/>
+      </p:nvGrpSpPr>
+      <p:grpSpPr>
+        <a:xfrm>
+          <a:off x="0" y="0"/>
+          <a:ext cx="0" cy="0"/>
+          <a:chOff x="0" y="0"/>
+          <a:chExt cx="0" cy="0"/>
+        </a:xfrm>
+      </p:grpSpPr>
+      <p:sp>
+        <p:nvSpPr>
+          <p:cNvPr id="3" name="Rectangle 2"/>
+          <p:cNvSpPr>
+            <a:spLocks noGrp="1"/>
+          </p:cNvSpPr>
+          <p:nvPr>
+            <p:ph type="ctrTitle"/>
+          </p:nvPr>
+        </p:nvSpPr>
+        <p:spPr/>
+        <p:txBody>
+          <a:bodyPr/>
+          <a:lstStyle>
+            <a:extLst/>
+          </a:lstStyle>
+          <a:p>
+            <a:r>
+              <a:rPr lang="sl-SI" dirty="0"/>
+              <a:t>2</a:t>
+            </a:r>
+            <a:r>
+              <a:rPr lang="sl-SI" dirty="0" smtClean="0"/>
+              <a:t>. </a:t>
+            </a:r>
+            <a:r>
+              <a:rPr lang="sl-SI" dirty="0" smtClean="0"/>
+              <a:t>Predstavitev problema</a:t>
+            </a:r>
+            <a:endParaRPr lang="en-US" dirty="0"/>
+          </a:p>
+        </p:txBody>
+      </p:sp>
+      <p:pic>
+        <p:nvPicPr>
+          <p:cNvPr id="4" name="Content Placeholder 11"/>
+          <p:cNvPicPr>
+            <a:picLocks noChangeAspect="1"/>
+          </p:cNvPicPr>
+          <p:nvPr/>
+        </p:nvPicPr>
+        <p:blipFill>
+          <a:blip r:embed="rId3" cstate="print">
+            <a:extLst>
+              <a:ext uri="{28A0092B-C50C-407E-A947-70E740481C1C}">
+                <a14:useLocalDpi xmlns:a14="http://schemas.microsoft.com/office/drawing/2010/main" val="0"/>
+              </a:ext>
+            </a:extLst>
+          </a:blip>
+          <a:stretch>
+            <a:fillRect/>
+          </a:stretch>
+        </p:blipFill>
+        <p:spPr>
+          <a:xfrm>
+            <a:off x="6660232" y="5301208"/>
+            <a:ext cx="2352307" cy="1470192"/>
+          </a:xfrm>
+          <a:prstGeom prst="rect">
+            <a:avLst/>
+          </a:prstGeom>
+        </p:spPr>
+      </p:pic>
+      <p:pic>
+        <p:nvPicPr>
+          <p:cNvPr id="2" name="Picture 1"/>
+          <p:cNvPicPr>
+            <a:picLocks noChangeAspect="1"/>
+          </p:cNvPicPr>
+          <p:nvPr/>
+        </p:nvPicPr>
+        <p:blipFill>
+          <a:blip r:embed="rId4" cstate="print">
+            <a:extLst>
+              <a:ext uri="{28A0092B-C50C-407E-A947-70E740481C1C}">
+                <a14:useLocalDpi xmlns:a14="http://schemas.microsoft.com/office/drawing/2010/main" val="0"/>
+              </a:ext>
+            </a:extLst>
+          </a:blip>
+          <a:stretch>
+            <a:fillRect/>
+          </a:stretch>
+        </p:blipFill>
+        <p:spPr>
+          <a:xfrm>
+            <a:off x="1979712" y="586763"/>
+            <a:ext cx="5220072" cy="3100667"/>
+          </a:xfrm>
+          <a:prstGeom prst="rect">
+            <a:avLst/>
+          </a:prstGeom>
+        </p:spPr>
+      </p:pic>
+    </p:spTree>
+    <p:extLst>
+      <p:ext uri="{BB962C8B-B14F-4D97-AF65-F5344CB8AC3E}">
+        <p14:creationId xmlns:p14="http://schemas.microsoft.com/office/powerpoint/2010/main" val="1832745"/>
+      </p:ext>
+    </p:extLst>
+  </p:cSld>
+  <p:clrMapOvr>
+    <a:masterClrMapping/>
+  </p:clrMapOvr>
+  <p:timing>
+    <p:tnLst>
+      <p:par>
+        <p:cTn id="1" dur="indefinite" restart="never" nodeType="tmRoot"/>
+      </p:par>
+    </p:tnLst>
+  </p:timing>
+</p:sld>
+</file>
+
+<file path=ppt/slides/slide7.xml><?xml version="1.0" encoding="utf-8"?>
+<p:sld xmlns:a="http://schemas.openxmlformats.org/drawingml/2006/main" xmlns:r="http://schemas.openxmlformats.org/officeDocument/2006/relationships" xmlns:p="http://schemas.openxmlformats.org/presentationml/2006/main">
+  <p:cSld>
+    <p:spTree>
+      <p:nvGrpSpPr>
+        <p:cNvPr id="1" name=""/>
+        <p:cNvGrpSpPr/>
+        <p:nvPr/>
+      </p:nvGrpSpPr>
+      <p:grpSpPr>
+        <a:xfrm>
+          <a:off x="0" y="0"/>
+          <a:ext cx="0" cy="0"/>
+          <a:chOff x="0" y="0"/>
+          <a:chExt cx="0" cy="0"/>
+        </a:xfrm>
+      </p:grpSpPr>
+      <p:sp>
+        <p:nvSpPr>
+          <p:cNvPr id="29" name="Rectangle 2"/>
+          <p:cNvSpPr>
+            <a:spLocks noGrp="1"/>
+          </p:cNvSpPr>
+          <p:nvPr>
+            <p:ph type="title"/>
+          </p:nvPr>
+        </p:nvSpPr>
+        <p:spPr/>
+        <p:txBody>
+          <a:bodyPr>
+            <a:normAutofit fontScale="90000"/>
+          </a:bodyPr>
+          <a:lstStyle>
+            <a:extLst/>
+          </a:lstStyle>
+          <a:p>
+            <a:r>
+              <a:rPr lang="sl-SI" dirty="0" smtClean="0"/>
+              <a:t>Predstavitev problema</a:t>
+            </a:r>
+            <a:endParaRPr lang="en-US" dirty="0"/>
+          </a:p>
+        </p:txBody>
+      </p:sp>
+      <p:sp>
+        <p:nvSpPr>
+          <p:cNvPr id="2" name="Rectangle 3"/>
+          <p:cNvSpPr>
+            <a:spLocks noGrp="1"/>
+          </p:cNvSpPr>
+          <p:nvPr>
+            <p:ph type="body" sz="quarter" idx="13"/>
+          </p:nvPr>
+        </p:nvSpPr>
+        <p:spPr>
+          <a:xfrm>
+            <a:off x="304800" y="381000"/>
+            <a:ext cx="8077200" cy="599728"/>
+          </a:xfrm>
+        </p:spPr>
+        <p:txBody>
+          <a:bodyPr>
+            <a:noAutofit/>
+          </a:bodyPr>
+          <a:lstStyle>
+            <a:extLst/>
+          </a:lstStyle>
+          <a:p>
+            <a:r>
+              <a:rPr lang="sl-SI" sz="3600" dirty="0" smtClean="0"/>
+              <a:t>Pretvorba iz Jave v C#</a:t>
+            </a:r>
+            <a:endParaRPr lang="en-US" sz="3600" dirty="0"/>
+          </a:p>
+        </p:txBody>
+      </p:sp>
+      <p:pic>
+        <p:nvPicPr>
+          <p:cNvPr id="12" name="Content Placeholder 11"/>
+          <p:cNvPicPr>
+            <a:picLocks noGrp="1" noChangeAspect="1"/>
+          </p:cNvPicPr>
+          <p:nvPr>
+            <p:ph sz="quarter" idx="15"/>
+          </p:nvPr>
+        </p:nvPicPr>
+        <p:blipFill>
+          <a:blip r:embed="rId3" cstate="print">
+            <a:extLst>
+              <a:ext uri="{28A0092B-C50C-407E-A947-70E740481C1C}">
+                <a14:useLocalDpi xmlns:a14="http://schemas.microsoft.com/office/drawing/2010/main" val="0"/>
+              </a:ext>
+            </a:extLst>
+          </a:blip>
+          <a:stretch>
+            <a:fillRect/>
+          </a:stretch>
+        </p:blipFill>
+        <p:spPr>
+          <a:xfrm>
+            <a:off x="6180133" y="5343184"/>
+            <a:ext cx="2352307" cy="1470192"/>
+          </a:xfrm>
+        </p:spPr>
+      </p:pic>
+      <p:sp>
+        <p:nvSpPr>
+          <p:cNvPr id="5" name="Rectangle 4"/>
+          <p:cNvSpPr>
+            <a:spLocks noGrp="1"/>
+          </p:cNvSpPr>
+          <p:nvPr>
+            <p:ph sz="quarter" idx="15"/>
+          </p:nvPr>
+        </p:nvSpPr>
+        <p:spPr>
+          <a:xfrm>
+            <a:off x="323528" y="1052736"/>
+            <a:ext cx="8074152" cy="5544616"/>
+          </a:xfrm>
+        </p:spPr>
+        <p:txBody>
+          <a:bodyPr>
+            <a:normAutofit/>
+          </a:bodyPr>
+          <a:lstStyle>
+            <a:extLst/>
+          </a:lstStyle>
+          <a:p>
+            <a:pPr marL="342900" marR="0" indent="-342900" algn="l" rtl="0" latinLnBrk="0">
+              <a:spcBef>
+                <a:spcPct val="20000"/>
+              </a:spcBef>
+              <a:buFont typeface="Arial" pitchFamily="34" charset="0"/>
+              <a:buChar char="•"/>
+            </a:pPr>
+            <a:r>
+              <a:rPr lang="sl-SI" sz="1800" dirty="0" smtClean="0"/>
+              <a:t>Podobnost obeh jezikov olajša prehod</a:t>
+            </a:r>
+          </a:p>
+          <a:p>
+            <a:pPr marL="342900" marR="0" indent="-342900" algn="l" rtl="0" latinLnBrk="0">
+              <a:spcBef>
+                <a:spcPct val="20000"/>
+              </a:spcBef>
+              <a:buFont typeface="Arial" pitchFamily="34" charset="0"/>
+              <a:buChar char="•"/>
+            </a:pPr>
+            <a:r>
+              <a:rPr lang="sl-SI" sz="1800" dirty="0" smtClean="0"/>
+              <a:t>Projekt je šel skozi več razvojnih ciklov</a:t>
+            </a:r>
+          </a:p>
+          <a:p>
+            <a:pPr marL="1085850" lvl="1" indent="-342900">
+              <a:buFont typeface="Wingdings" pitchFamily="2" charset="2"/>
+              <a:buChar char="Ø"/>
+            </a:pPr>
+            <a:r>
+              <a:rPr lang="sl-SI" sz="1800" dirty="0" smtClean="0"/>
+              <a:t>Posledično je na njem delalo več različnih skupin</a:t>
+            </a:r>
+          </a:p>
+          <a:p>
+            <a:pPr marL="1085850" lvl="1" indent="-342900">
+              <a:buFont typeface="Wingdings" pitchFamily="2" charset="2"/>
+              <a:buChar char="Ø"/>
+            </a:pPr>
+            <a:r>
+              <a:rPr lang="sl-SI" sz="1800" dirty="0" smtClean="0"/>
+              <a:t>Veliko redundance</a:t>
+            </a:r>
+            <a:endParaRPr lang="sl-SI" sz="1800" dirty="0"/>
+          </a:p>
+          <a:p>
+            <a:pPr marL="342900" indent="-342900">
+              <a:buFont typeface="Arial" pitchFamily="34" charset="0"/>
+              <a:buChar char="•"/>
+            </a:pPr>
+            <a:r>
+              <a:rPr lang="sl-SI" sz="1800" dirty="0" smtClean="0"/>
+              <a:t>Nekateri deli so bolj jasno definirani v predhodniku (</a:t>
+            </a:r>
+            <a:r>
+              <a:rPr lang="sl-SI" sz="1800" dirty="0" err="1" smtClean="0"/>
+              <a:t>WinRobSim</a:t>
+            </a:r>
+            <a:r>
+              <a:rPr lang="sl-SI" sz="1800" dirty="0" smtClean="0"/>
+              <a:t>), ki je spisan v programskem jeziku PASCAL (razvojno okolje </a:t>
+            </a:r>
+            <a:r>
+              <a:rPr lang="sl-SI" sz="1800" dirty="0" err="1" smtClean="0"/>
+              <a:t>Delphi</a:t>
+            </a:r>
+            <a:r>
+              <a:rPr lang="sl-SI" sz="1800" dirty="0" smtClean="0"/>
+              <a:t>)</a:t>
+            </a:r>
+          </a:p>
+          <a:p>
+            <a:pPr marL="342900" indent="-342900">
+              <a:buFont typeface="Arial" pitchFamily="34" charset="0"/>
+              <a:buChar char="•"/>
+            </a:pPr>
+            <a:r>
+              <a:rPr lang="sl-SI" sz="1800" dirty="0" smtClean="0"/>
+              <a:t>Večinski delež implementacije opravljen „</a:t>
+            </a:r>
+            <a:r>
+              <a:rPr lang="sl-SI" sz="1800" dirty="0" err="1" smtClean="0"/>
+              <a:t>from</a:t>
+            </a:r>
+            <a:r>
+              <a:rPr lang="sl-SI" sz="1800" dirty="0" smtClean="0"/>
+              <a:t> </a:t>
+            </a:r>
+            <a:r>
+              <a:rPr lang="sl-SI" sz="1800" dirty="0" err="1" smtClean="0"/>
+              <a:t>scratch</a:t>
+            </a:r>
+            <a:r>
+              <a:rPr lang="sl-SI" sz="1800" dirty="0" smtClean="0"/>
+              <a:t>“ </a:t>
+            </a:r>
+            <a:endParaRPr lang="sl-SI" sz="1800" dirty="0" smtClean="0"/>
+          </a:p>
+        </p:txBody>
+      </p:sp>
+    </p:spTree>
+    <p:extLst>
+      <p:ext uri="{BB962C8B-B14F-4D97-AF65-F5344CB8AC3E}">
+        <p14:creationId xmlns:p14="http://schemas.microsoft.com/office/powerpoint/2010/main" val="20566398"/>
+      </p:ext>
+    </p:extLst>
+  </p:cSld>
+  <p:clrMapOvr>
+    <a:masterClrMapping/>
+  </p:clrMapOvr>
+  <p:timing>
+    <p:tnLst>
+      <p:par>
+        <p:cTn id="1" dur="indefinite" restart="never" nodeType="tmRoot"/>
+      </p:par>
+    </p:tnLst>
+  </p:timing>
+</p:sld>
+</file>
+
+<file path=ppt/slides/slide8.xml><?xml version="1.0" encoding="utf-8"?>
+<p:sld xmlns:a="http://schemas.openxmlformats.org/drawingml/2006/main" xmlns:r="http://schemas.openxmlformats.org/officeDocument/2006/relationships" xmlns:p="http://schemas.openxmlformats.org/presentationml/2006/main">
+  <p:cSld>
+    <p:spTree>
+      <p:nvGrpSpPr>
+        <p:cNvPr id="1" name=""/>
+        <p:cNvGrpSpPr/>
+        <p:nvPr/>
+      </p:nvGrpSpPr>
+      <p:grpSpPr>
+        <a:xfrm>
+          <a:off x="0" y="0"/>
+          <a:ext cx="0" cy="0"/>
+          <a:chOff x="0" y="0"/>
+          <a:chExt cx="0" cy="0"/>
+        </a:xfrm>
+      </p:grpSpPr>
+      <p:sp>
+        <p:nvSpPr>
+          <p:cNvPr id="3" name="Rectangle 2"/>
+          <p:cNvSpPr>
+            <a:spLocks noGrp="1"/>
+          </p:cNvSpPr>
+          <p:nvPr>
+            <p:ph type="ctrTitle"/>
+          </p:nvPr>
+        </p:nvSpPr>
+        <p:spPr/>
+        <p:txBody>
+          <a:bodyPr/>
+          <a:lstStyle>
+            <a:extLst/>
+          </a:lstStyle>
+          <a:p>
+            <a:r>
+              <a:rPr lang="sl-SI" dirty="0" smtClean="0"/>
+              <a:t>3. </a:t>
+            </a:r>
+            <a:r>
+              <a:rPr lang="sl-SI" dirty="0" smtClean="0"/>
+              <a:t>Opis Simulatorja</a:t>
+            </a:r>
+            <a:endParaRPr lang="en-US" dirty="0"/>
+          </a:p>
+        </p:txBody>
+      </p:sp>
+      <p:pic>
+        <p:nvPicPr>
+          <p:cNvPr id="4" name="Content Placeholder 11"/>
+          <p:cNvPicPr>
+            <a:picLocks noChangeAspect="1"/>
+          </p:cNvPicPr>
+          <p:nvPr/>
+        </p:nvPicPr>
+        <p:blipFill>
+          <a:blip r:embed="rId3" cstate="print">
+            <a:extLst>
+              <a:ext uri="{28A0092B-C50C-407E-A947-70E740481C1C}">
+                <a14:useLocalDpi xmlns:a14="http://schemas.microsoft.com/office/drawing/2010/main" val="0"/>
+              </a:ext>
+            </a:extLst>
+          </a:blip>
+          <a:stretch>
+            <a:fillRect/>
+          </a:stretch>
+        </p:blipFill>
+        <p:spPr>
+          <a:xfrm>
+            <a:off x="6660232" y="5301208"/>
+            <a:ext cx="2352307" cy="1470192"/>
+          </a:xfrm>
+          <a:prstGeom prst="rect">
+            <a:avLst/>
+          </a:prstGeom>
+        </p:spPr>
+      </p:pic>
+      <p:pic>
+        <p:nvPicPr>
+          <p:cNvPr id="2" name="Picture 1"/>
+          <p:cNvPicPr>
+            <a:picLocks noChangeAspect="1"/>
+          </p:cNvPicPr>
+          <p:nvPr/>
+        </p:nvPicPr>
+        <p:blipFill>
+          <a:blip r:embed="rId4" cstate="print">
+            <a:extLst>
+              <a:ext uri="{28A0092B-C50C-407E-A947-70E740481C1C}">
+                <a14:useLocalDpi xmlns:a14="http://schemas.microsoft.com/office/drawing/2010/main" val="0"/>
+              </a:ext>
+            </a:extLst>
+          </a:blip>
+          <a:stretch>
+            <a:fillRect/>
+          </a:stretch>
+        </p:blipFill>
+        <p:spPr>
+          <a:xfrm>
+            <a:off x="1979712" y="586763"/>
+            <a:ext cx="5220072" cy="3100667"/>
+          </a:xfrm>
+          <a:prstGeom prst="rect">
+            <a:avLst/>
+          </a:prstGeom>
+        </p:spPr>
+      </p:pic>
+    </p:spTree>
+    <p:extLst>
+      <p:ext uri="{BB962C8B-B14F-4D97-AF65-F5344CB8AC3E}">
+        <p14:creationId xmlns:p14="http://schemas.microsoft.com/office/powerpoint/2010/main" val="2380646032"/>
+      </p:ext>
+    </p:extLst>
+  </p:cSld>
+  <p:clrMapOvr>
+    <a:masterClrMapping/>
+  </p:clrMapOvr>
+  <p:timing>
+    <p:tnLst>
+      <p:par>
+        <p:cTn id="1" dur="indefinite" restart="never" nodeType="tmRoot"/>
+      </p:par>
+    </p:tnLst>
+  </p:timing>
+</p:sld>
+</file>
+
+<file path=ppt/slides/slide9.xml><?xml version="1.0" encoding="utf-8"?>
+<p:sld xmlns:a="http://schemas.openxmlformats.org/drawingml/2006/main" xmlns:r="http://schemas.openxmlformats.org/officeDocument/2006/relationships" xmlns:p="http://schemas.openxmlformats.org/presentationml/2006/main">
+  <p:cSld>
+    <p:spTree>
+      <p:nvGrpSpPr>
+        <p:cNvPr id="1" name=""/>
+        <p:cNvGrpSpPr/>
+        <p:nvPr/>
+      </p:nvGrpSpPr>
+      <p:grpSpPr>
+        <a:xfrm>
+          <a:off x="0" y="0"/>
+          <a:ext cx="0" cy="0"/>
+          <a:chOff x="0" y="0"/>
+          <a:chExt cx="0" cy="0"/>
+        </a:xfrm>
+      </p:grpSpPr>
+      <p:sp>
+        <p:nvSpPr>
+          <p:cNvPr id="29" name="Rectangle 2"/>
+          <p:cNvSpPr>
+            <a:spLocks noGrp="1"/>
+          </p:cNvSpPr>
+          <p:nvPr>
+            <p:ph type="title"/>
+          </p:nvPr>
+        </p:nvSpPr>
+        <p:spPr/>
+        <p:txBody>
+          <a:bodyPr>
+            <a:normAutofit fontScale="90000"/>
+          </a:bodyPr>
+          <a:lstStyle>
+            <a:extLst/>
+          </a:lstStyle>
+          <a:p>
+            <a:r>
+              <a:rPr lang="sl-SI" dirty="0" smtClean="0"/>
+              <a:t>Opis simulatorja</a:t>
+            </a:r>
+            <a:endParaRPr lang="en-US" dirty="0"/>
+          </a:p>
+        </p:txBody>
+      </p:sp>
+      <p:sp>
+        <p:nvSpPr>
+          <p:cNvPr id="2" name="Rectangle 3"/>
+          <p:cNvSpPr>
+            <a:spLocks noGrp="1"/>
+          </p:cNvSpPr>
+          <p:nvPr>
+            <p:ph type="body" sz="quarter" idx="13"/>
+          </p:nvPr>
+        </p:nvSpPr>
+        <p:spPr>
+          <a:xfrm>
+            <a:off x="304800" y="381000"/>
+            <a:ext cx="8077200" cy="599728"/>
+          </a:xfrm>
+        </p:spPr>
+        <p:txBody>
+          <a:bodyPr>
+            <a:noAutofit/>
+          </a:bodyPr>
+          <a:lstStyle>
+            <a:extLst/>
+          </a:lstStyle>
+          <a:p>
+            <a:r>
+              <a:rPr lang="sl-SI" sz="3600" dirty="0" smtClean="0"/>
+              <a:t>Model robota</a:t>
+            </a:r>
+            <a:endParaRPr lang="en-US" sz="3600" dirty="0"/>
+          </a:p>
+        </p:txBody>
+      </p:sp>
+      <p:pic>
+        <p:nvPicPr>
+          <p:cNvPr id="12" name="Content Placeholder 11"/>
+          <p:cNvPicPr>
+            <a:picLocks noGrp="1" noChangeAspect="1"/>
+          </p:cNvPicPr>
+          <p:nvPr>
+            <p:ph sz="quarter" idx="15"/>
+          </p:nvPr>
+        </p:nvPicPr>
+        <p:blipFill>
+          <a:blip r:embed="rId3" cstate="print">
+            <a:extLst>
+              <a:ext uri="{28A0092B-C50C-407E-A947-70E740481C1C}">
+                <a14:useLocalDpi xmlns:a14="http://schemas.microsoft.com/office/drawing/2010/main" val="0"/>
+              </a:ext>
+            </a:extLst>
+          </a:blip>
+          <a:stretch>
+            <a:fillRect/>
+          </a:stretch>
+        </p:blipFill>
+        <p:spPr>
+          <a:xfrm>
+            <a:off x="6180133" y="5343184"/>
+            <a:ext cx="2352307" cy="1470192"/>
+          </a:xfrm>
+        </p:spPr>
+      </p:pic>
+      <p:sp>
+        <p:nvSpPr>
+          <p:cNvPr id="5" name="Rectangle 4"/>
+          <p:cNvSpPr>
+            <a:spLocks noGrp="1"/>
+          </p:cNvSpPr>
+          <p:nvPr>
+            <p:ph sz="quarter" idx="15"/>
+          </p:nvPr>
+        </p:nvSpPr>
+        <p:spPr>
+          <a:xfrm>
+            <a:off x="323528" y="1052736"/>
+            <a:ext cx="8074152" cy="5544616"/>
+          </a:xfrm>
+        </p:spPr>
+        <p:txBody>
+          <a:bodyPr>
+            <a:normAutofit/>
+          </a:bodyPr>
+          <a:lstStyle>
+            <a:extLst/>
+          </a:lstStyle>
+          <a:p>
+            <a:pPr marL="342900" marR="0" indent="-342900" algn="l" rtl="0" latinLnBrk="0">
+              <a:spcBef>
+                <a:spcPct val="20000"/>
+              </a:spcBef>
+              <a:buFont typeface="Arial" pitchFamily="34" charset="0"/>
+              <a:buChar char="•"/>
+            </a:pPr>
+            <a:endParaRPr lang="sl-SI" sz="1800" dirty="0" smtClean="0"/>
+          </a:p>
+        </p:txBody>
+      </p:sp>
+    </p:spTree>
+    <p:extLst>
+      <p:ext uri="{BB962C8B-B14F-4D97-AF65-F5344CB8AC3E}">
+        <p14:creationId xmlns:p14="http://schemas.microsoft.com/office/powerpoint/2010/main" val="3983884448"/>
       </p:ext>
     </p:extLst>
   </p:cSld>

</xml_diff>

<commit_message>
Dopolnjeno poglavje Model robota, spremenjene slike za poglavje 3
</commit_message>
<xml_diff>
--- a/Robot_simulator/Dokumentacija/MotomanPredstavitev.pptx
+++ b/Robot_simulator/Dokumentacija/MotomanPredstavitev.pptx
@@ -10585,7 +10585,7 @@
       </p:pic>
       <p:pic>
         <p:nvPicPr>
-          <p:cNvPr id="2" name="Picture 1"/>
+          <p:cNvPr id="5" name="Picture 4"/>
           <p:cNvPicPr>
             <a:picLocks noChangeAspect="1"/>
           </p:cNvPicPr>
@@ -10605,8 +10605,38 @@
         </p:blipFill>
         <p:spPr>
           <a:xfrm>
-            <a:off x="1979712" y="586763"/>
-            <a:ext cx="5220072" cy="3100667"/>
+            <a:off x="5724128" y="529745"/>
+            <a:ext cx="2536328" cy="3079306"/>
+          </a:xfrm>
+          <a:prstGeom prst="rect">
+            <a:avLst/>
+          </a:prstGeom>
+        </p:spPr>
+      </p:pic>
+      <p:pic>
+        <p:nvPicPr>
+          <p:cNvPr id="6" name="Picture 5"/>
+          <p:cNvPicPr>
+            <a:picLocks noChangeAspect="1"/>
+          </p:cNvPicPr>
+          <p:nvPr/>
+        </p:nvPicPr>
+        <p:blipFill>
+          <a:blip r:embed="rId5">
+            <a:extLst>
+              <a:ext uri="{28A0092B-C50C-407E-A947-70E740481C1C}">
+                <a14:useLocalDpi xmlns:a14="http://schemas.microsoft.com/office/drawing/2010/main" val="0"/>
+              </a:ext>
+            </a:extLst>
+          </a:blip>
+          <a:stretch>
+            <a:fillRect/>
+          </a:stretch>
+        </p:blipFill>
+        <p:spPr>
+          <a:xfrm>
+            <a:off x="683568" y="606127"/>
+            <a:ext cx="4677214" cy="2966889"/>
           </a:xfrm>
           <a:prstGeom prst="rect">
             <a:avLst/>
@@ -10751,7 +10781,7 @@
         <p:spPr>
           <a:xfrm>
             <a:off x="323528" y="1052736"/>
-            <a:ext cx="8074152" cy="5544616"/>
+            <a:ext cx="3744416" cy="5544616"/>
           </a:xfrm>
         </p:spPr>
         <p:txBody>
@@ -10769,10 +10799,116 @@
               <a:buFont typeface="Arial" pitchFamily="34" charset="0"/>
               <a:buChar char="•"/>
             </a:pPr>
+            <a:r>
+              <a:rPr lang="sl-SI" sz="1800" dirty="0" smtClean="0"/>
+              <a:t>Izdelan v modelirnem orodju </a:t>
+            </a:r>
+            <a:r>
+              <a:rPr lang="sl-SI" sz="1800" dirty="0" err="1" smtClean="0"/>
+              <a:t>LightWave</a:t>
+            </a:r>
+            <a:r>
+              <a:rPr lang="sl-SI" sz="1800" dirty="0" smtClean="0"/>
+              <a:t> 3D</a:t>
+            </a:r>
+          </a:p>
+          <a:p>
+            <a:pPr marL="342900" marR="0" indent="-342900" algn="l" rtl="0" latinLnBrk="0">
+              <a:spcBef>
+                <a:spcPct val="20000"/>
+              </a:spcBef>
+              <a:buFont typeface="Arial" pitchFamily="34" charset="0"/>
+              <a:buChar char="•"/>
+            </a:pPr>
+            <a:r>
+              <a:rPr lang="sl-SI" sz="1800" dirty="0" smtClean="0"/>
+              <a:t>Uporaba v </a:t>
+            </a:r>
+            <a:r>
+              <a:rPr lang="sl-SI" sz="1800" dirty="0" err="1" smtClean="0"/>
+              <a:t>Visual</a:t>
+            </a:r>
+            <a:r>
+              <a:rPr lang="sl-SI" sz="1800" dirty="0" smtClean="0"/>
+              <a:t> Studio:</a:t>
+            </a:r>
             <a:endParaRPr lang="sl-SI" sz="1800" dirty="0" smtClean="0"/>
           </a:p>
-        </p:txBody>
-      </p:sp>
+          <a:p>
+            <a:pPr marL="1085850" lvl="1" indent="-342900">
+              <a:buFont typeface="Arial" pitchFamily="34" charset="0"/>
+              <a:buChar char="•"/>
+            </a:pPr>
+            <a:r>
+              <a:rPr lang="sl-SI" sz="1800" dirty="0" smtClean="0"/>
+              <a:t>Izvoz v datoteko .LWO</a:t>
+            </a:r>
+          </a:p>
+          <a:p>
+            <a:pPr marL="1085850" lvl="1" indent="-342900">
+              <a:buFont typeface="Arial" pitchFamily="34" charset="0"/>
+              <a:buChar char="•"/>
+            </a:pPr>
+            <a:r>
+              <a:rPr lang="sl-SI" sz="1800" dirty="0" smtClean="0"/>
+              <a:t>Uporaba </a:t>
+            </a:r>
+            <a:r>
+              <a:rPr lang="sl-SI" sz="1800" dirty="0" err="1" smtClean="0"/>
+              <a:t>LightWave</a:t>
+            </a:r>
+            <a:r>
+              <a:rPr lang="sl-SI" sz="1800" dirty="0" smtClean="0"/>
+              <a:t> knjižnice </a:t>
+            </a:r>
+            <a:r>
+              <a:rPr lang="sl-SI" sz="1800" dirty="0" err="1" smtClean="0"/>
+              <a:t>ClassLibrary.dll</a:t>
+            </a:r>
+            <a:endParaRPr lang="sl-SI" sz="1800" dirty="0"/>
+          </a:p>
+          <a:p>
+            <a:pPr marL="342900" indent="-342900">
+              <a:buFont typeface="Arial" pitchFamily="34" charset="0"/>
+              <a:buChar char="•"/>
+            </a:pPr>
+            <a:r>
+              <a:rPr lang="sl-SI" sz="1800" dirty="0" smtClean="0"/>
+              <a:t>Za avtentičnost izkušnje dodani še dodatni objekti okoli robota</a:t>
+            </a:r>
+          </a:p>
+        </p:txBody>
+      </p:sp>
+      <p:pic>
+        <p:nvPicPr>
+          <p:cNvPr id="3" name="Picture 2"/>
+          <p:cNvPicPr>
+            <a:picLocks noChangeAspect="1"/>
+          </p:cNvPicPr>
+          <p:nvPr/>
+        </p:nvPicPr>
+        <p:blipFill>
+          <a:blip r:embed="rId4">
+            <a:extLst>
+              <a:ext uri="{28A0092B-C50C-407E-A947-70E740481C1C}">
+                <a14:useLocalDpi xmlns:a14="http://schemas.microsoft.com/office/drawing/2010/main" val="0"/>
+              </a:ext>
+            </a:extLst>
+          </a:blip>
+          <a:stretch>
+            <a:fillRect/>
+          </a:stretch>
+        </p:blipFill>
+        <p:spPr>
+          <a:xfrm>
+            <a:off x="4123897" y="1052736"/>
+            <a:ext cx="4264527" cy="4809399"/>
+          </a:xfrm>
+          <a:prstGeom prst="rect">
+            <a:avLst/>
+          </a:prstGeom>
+        </p:spPr>
+      </p:pic>
     </p:spTree>
     <p:extLst>
       <p:ext uri="{BB962C8B-B14F-4D97-AF65-F5344CB8AC3E}">

</xml_diff>

<commit_message>
Dodani poglavji Rezkar in Jezik robota
</commit_message>
<xml_diff>
--- a/Robot_simulator/Dokumentacija/MotomanPredstavitev.pptx
+++ b/Robot_simulator/Dokumentacija/MotomanPredstavitev.pptx
@@ -5,10 +5,10 @@
     <p:sldMasterId id="2147483648" r:id="rId1"/>
   </p:sldMasterIdLst>
   <p:notesMasterIdLst>
-    <p:notesMasterId r:id="rId11"/>
+    <p:notesMasterId r:id="rId14"/>
   </p:notesMasterIdLst>
   <p:handoutMasterIdLst>
-    <p:handoutMasterId r:id="rId12"/>
+    <p:handoutMasterId r:id="rId15"/>
   </p:handoutMasterIdLst>
   <p:sldIdLst>
     <p:sldId id="256" r:id="rId2"/>
@@ -20,6 +20,9 @@
     <p:sldId id="287" r:id="rId8"/>
     <p:sldId id="288" r:id="rId9"/>
     <p:sldId id="289" r:id="rId10"/>
+    <p:sldId id="290" r:id="rId11"/>
+    <p:sldId id="291" r:id="rId12"/>
+    <p:sldId id="292" r:id="rId13"/>
   </p:sldIdLst>
   <p:sldSz cx="9144000" cy="6858000" type="screen4x3"/>
   <p:notesSz cx="6858000" cy="9144000"/>
@@ -701,6 +704,258 @@
               <a:rPr lang="en-US" smtClean="0"/>
               <a:pPr/>
               <a:t>1</a:t>
+            </a:fld>
+            <a:endParaRPr lang="en-US"/>
+          </a:p>
+        </p:txBody>
+      </p:sp>
+    </p:spTree>
+  </p:cSld>
+  <p:clrMapOvr>
+    <a:masterClrMapping/>
+  </p:clrMapOvr>
+</p:notes>
+</file>
+
+<file path=ppt/notesSlides/notesSlide10.xml><?xml version="1.0" encoding="utf-8"?>
+<p:notes xmlns:a="http://schemas.openxmlformats.org/drawingml/2006/main" xmlns:r="http://schemas.openxmlformats.org/officeDocument/2006/relationships" xmlns:p="http://schemas.openxmlformats.org/presentationml/2006/main">
+  <p:cSld>
+    <p:spTree>
+      <p:nvGrpSpPr>
+        <p:cNvPr id="1" name=""/>
+        <p:cNvGrpSpPr/>
+        <p:nvPr/>
+      </p:nvGrpSpPr>
+      <p:grpSpPr>
+        <a:xfrm>
+          <a:off x="0" y="0"/>
+          <a:ext cx="0" cy="0"/>
+          <a:chOff x="0" y="0"/>
+          <a:chExt cx="0" cy="0"/>
+        </a:xfrm>
+      </p:grpSpPr>
+      <p:sp>
+        <p:nvSpPr>
+          <p:cNvPr id="2" name="Rectangle 2"/>
+          <p:cNvSpPr>
+            <a:spLocks noGrp="1" noRot="1" noChangeAspect="1"/>
+          </p:cNvSpPr>
+          <p:nvPr>
+            <p:ph type="sldImg"/>
+          </p:nvPr>
+        </p:nvSpPr>
+        <p:spPr/>
+      </p:sp>
+      <p:sp>
+        <p:nvSpPr>
+          <p:cNvPr id="3" name="Rectangle 3"/>
+          <p:cNvSpPr>
+            <a:spLocks noGrp="1"/>
+          </p:cNvSpPr>
+          <p:nvPr>
+            <p:ph type="body" idx="1"/>
+          </p:nvPr>
+        </p:nvSpPr>
+        <p:spPr/>
+        <p:txBody>
+          <a:bodyPr/>
+          <a:lstStyle>
+            <a:extLst/>
+          </a:lstStyle>
+          <a:p>
+            <a:endParaRPr lang="en-US"/>
+          </a:p>
+        </p:txBody>
+      </p:sp>
+      <p:sp>
+        <p:nvSpPr>
+          <p:cNvPr id="4" name="Rectangle 4"/>
+          <p:cNvSpPr>
+            <a:spLocks noGrp="1"/>
+          </p:cNvSpPr>
+          <p:nvPr>
+            <p:ph type="sldNum" sz="quarter" idx="10"/>
+          </p:nvPr>
+        </p:nvSpPr>
+        <p:spPr/>
+        <p:txBody>
+          <a:bodyPr/>
+          <a:lstStyle>
+            <a:extLst/>
+          </a:lstStyle>
+          <a:p>
+            <a:fld id="{B3A019F3-8596-4028-9847-CBD3A185B07A}" type="slidenum">
+              <a:rPr lang="en-US" smtClean="0"/>
+              <a:pPr/>
+              <a:t>10</a:t>
+            </a:fld>
+            <a:endParaRPr lang="en-US"/>
+          </a:p>
+        </p:txBody>
+      </p:sp>
+    </p:spTree>
+  </p:cSld>
+  <p:clrMapOvr>
+    <a:masterClrMapping/>
+  </p:clrMapOvr>
+</p:notes>
+</file>
+
+<file path=ppt/notesSlides/notesSlide11.xml><?xml version="1.0" encoding="utf-8"?>
+<p:notes xmlns:a="http://schemas.openxmlformats.org/drawingml/2006/main" xmlns:r="http://schemas.openxmlformats.org/officeDocument/2006/relationships" xmlns:p="http://schemas.openxmlformats.org/presentationml/2006/main">
+  <p:cSld>
+    <p:spTree>
+      <p:nvGrpSpPr>
+        <p:cNvPr id="1" name=""/>
+        <p:cNvGrpSpPr/>
+        <p:nvPr/>
+      </p:nvGrpSpPr>
+      <p:grpSpPr>
+        <a:xfrm>
+          <a:off x="0" y="0"/>
+          <a:ext cx="0" cy="0"/>
+          <a:chOff x="0" y="0"/>
+          <a:chExt cx="0" cy="0"/>
+        </a:xfrm>
+      </p:grpSpPr>
+      <p:sp>
+        <p:nvSpPr>
+          <p:cNvPr id="2" name="Rectangle 2"/>
+          <p:cNvSpPr>
+            <a:spLocks noGrp="1" noRot="1" noChangeAspect="1"/>
+          </p:cNvSpPr>
+          <p:nvPr>
+            <p:ph type="sldImg"/>
+          </p:nvPr>
+        </p:nvSpPr>
+        <p:spPr/>
+      </p:sp>
+      <p:sp>
+        <p:nvSpPr>
+          <p:cNvPr id="3" name="Rectangle 3"/>
+          <p:cNvSpPr>
+            <a:spLocks noGrp="1"/>
+          </p:cNvSpPr>
+          <p:nvPr>
+            <p:ph type="body" idx="1"/>
+          </p:nvPr>
+        </p:nvSpPr>
+        <p:spPr/>
+        <p:txBody>
+          <a:bodyPr/>
+          <a:lstStyle>
+            <a:extLst/>
+          </a:lstStyle>
+          <a:p>
+            <a:endParaRPr lang="en-US"/>
+          </a:p>
+        </p:txBody>
+      </p:sp>
+      <p:sp>
+        <p:nvSpPr>
+          <p:cNvPr id="4" name="Rectangle 4"/>
+          <p:cNvSpPr>
+            <a:spLocks noGrp="1"/>
+          </p:cNvSpPr>
+          <p:nvPr>
+            <p:ph type="sldNum" sz="quarter" idx="10"/>
+          </p:nvPr>
+        </p:nvSpPr>
+        <p:spPr/>
+        <p:txBody>
+          <a:bodyPr/>
+          <a:lstStyle>
+            <a:extLst/>
+          </a:lstStyle>
+          <a:p>
+            <a:fld id="{B3A019F3-8596-4028-9847-CBD3A185B07A}" type="slidenum">
+              <a:rPr lang="en-US" smtClean="0"/>
+              <a:pPr/>
+              <a:t>11</a:t>
+            </a:fld>
+            <a:endParaRPr lang="en-US"/>
+          </a:p>
+        </p:txBody>
+      </p:sp>
+    </p:spTree>
+  </p:cSld>
+  <p:clrMapOvr>
+    <a:masterClrMapping/>
+  </p:clrMapOvr>
+</p:notes>
+</file>
+
+<file path=ppt/notesSlides/notesSlide12.xml><?xml version="1.0" encoding="utf-8"?>
+<p:notes xmlns:a="http://schemas.openxmlformats.org/drawingml/2006/main" xmlns:r="http://schemas.openxmlformats.org/officeDocument/2006/relationships" xmlns:p="http://schemas.openxmlformats.org/presentationml/2006/main">
+  <p:cSld>
+    <p:spTree>
+      <p:nvGrpSpPr>
+        <p:cNvPr id="1" name=""/>
+        <p:cNvGrpSpPr/>
+        <p:nvPr/>
+      </p:nvGrpSpPr>
+      <p:grpSpPr>
+        <a:xfrm>
+          <a:off x="0" y="0"/>
+          <a:ext cx="0" cy="0"/>
+          <a:chOff x="0" y="0"/>
+          <a:chExt cx="0" cy="0"/>
+        </a:xfrm>
+      </p:grpSpPr>
+      <p:sp>
+        <p:nvSpPr>
+          <p:cNvPr id="2" name="Rectangle 2"/>
+          <p:cNvSpPr>
+            <a:spLocks noGrp="1" noRot="1" noChangeAspect="1"/>
+          </p:cNvSpPr>
+          <p:nvPr>
+            <p:ph type="sldImg"/>
+          </p:nvPr>
+        </p:nvSpPr>
+        <p:spPr/>
+      </p:sp>
+      <p:sp>
+        <p:nvSpPr>
+          <p:cNvPr id="3" name="Rectangle 3"/>
+          <p:cNvSpPr>
+            <a:spLocks noGrp="1"/>
+          </p:cNvSpPr>
+          <p:nvPr>
+            <p:ph type="body" idx="1"/>
+          </p:nvPr>
+        </p:nvSpPr>
+        <p:spPr/>
+        <p:txBody>
+          <a:bodyPr/>
+          <a:lstStyle>
+            <a:extLst/>
+          </a:lstStyle>
+          <a:p>
+            <a:endParaRPr lang="en-US"/>
+          </a:p>
+        </p:txBody>
+      </p:sp>
+      <p:sp>
+        <p:nvSpPr>
+          <p:cNvPr id="4" name="Rectangle 4"/>
+          <p:cNvSpPr>
+            <a:spLocks noGrp="1"/>
+          </p:cNvSpPr>
+          <p:nvPr>
+            <p:ph type="sldNum" sz="quarter" idx="10"/>
+          </p:nvPr>
+        </p:nvSpPr>
+        <p:spPr/>
+        <p:txBody>
+          <a:bodyPr/>
+          <a:lstStyle>
+            <a:extLst/>
+          </a:lstStyle>
+          <a:p>
+            <a:fld id="{B3A019F3-8596-4028-9847-CBD3A185B07A}" type="slidenum">
+              <a:rPr lang="en-US" smtClean="0"/>
+              <a:pPr/>
+              <a:t>12</a:t>
             </a:fld>
             <a:endParaRPr lang="en-US"/>
           </a:p>
@@ -9251,6 +9506,844 @@
 </p:sld>
 </file>
 
+<file path=ppt/slides/slide10.xml><?xml version="1.0" encoding="utf-8"?>
+<p:sld xmlns:a="http://schemas.openxmlformats.org/drawingml/2006/main" xmlns:r="http://schemas.openxmlformats.org/officeDocument/2006/relationships" xmlns:p="http://schemas.openxmlformats.org/presentationml/2006/main">
+  <p:cSld>
+    <p:spTree>
+      <p:nvGrpSpPr>
+        <p:cNvPr id="1" name=""/>
+        <p:cNvGrpSpPr/>
+        <p:nvPr/>
+      </p:nvGrpSpPr>
+      <p:grpSpPr>
+        <a:xfrm>
+          <a:off x="0" y="0"/>
+          <a:ext cx="0" cy="0"/>
+          <a:chOff x="0" y="0"/>
+          <a:chExt cx="0" cy="0"/>
+        </a:xfrm>
+      </p:grpSpPr>
+      <p:sp>
+        <p:nvSpPr>
+          <p:cNvPr id="29" name="Rectangle 2"/>
+          <p:cNvSpPr>
+            <a:spLocks noGrp="1"/>
+          </p:cNvSpPr>
+          <p:nvPr>
+            <p:ph type="title"/>
+          </p:nvPr>
+        </p:nvSpPr>
+        <p:spPr/>
+        <p:txBody>
+          <a:bodyPr>
+            <a:normAutofit fontScale="90000"/>
+          </a:bodyPr>
+          <a:lstStyle>
+            <a:extLst/>
+          </a:lstStyle>
+          <a:p>
+            <a:r>
+              <a:rPr lang="sl-SI" dirty="0" smtClean="0"/>
+              <a:t>Opis simulatorja</a:t>
+            </a:r>
+            <a:endParaRPr lang="en-US" dirty="0"/>
+          </a:p>
+        </p:txBody>
+      </p:sp>
+      <p:sp>
+        <p:nvSpPr>
+          <p:cNvPr id="2" name="Rectangle 3"/>
+          <p:cNvSpPr>
+            <a:spLocks noGrp="1"/>
+          </p:cNvSpPr>
+          <p:nvPr>
+            <p:ph type="body" sz="quarter" idx="13"/>
+          </p:nvPr>
+        </p:nvSpPr>
+        <p:spPr>
+          <a:xfrm>
+            <a:off x="304800" y="381000"/>
+            <a:ext cx="8077200" cy="599728"/>
+          </a:xfrm>
+        </p:spPr>
+        <p:txBody>
+          <a:bodyPr>
+            <a:noAutofit/>
+          </a:bodyPr>
+          <a:lstStyle>
+            <a:extLst/>
+          </a:lstStyle>
+          <a:p>
+            <a:r>
+              <a:rPr lang="sl-SI" sz="3600" dirty="0" smtClean="0"/>
+              <a:t>Rezkar - 1</a:t>
+            </a:r>
+            <a:endParaRPr lang="en-US" sz="3600" dirty="0"/>
+          </a:p>
+        </p:txBody>
+      </p:sp>
+      <p:pic>
+        <p:nvPicPr>
+          <p:cNvPr id="12" name="Content Placeholder 11"/>
+          <p:cNvPicPr>
+            <a:picLocks noGrp="1" noChangeAspect="1"/>
+          </p:cNvPicPr>
+          <p:nvPr>
+            <p:ph sz="quarter" idx="15"/>
+          </p:nvPr>
+        </p:nvPicPr>
+        <p:blipFill>
+          <a:blip r:embed="rId3" cstate="print">
+            <a:extLst>
+              <a:ext uri="{28A0092B-C50C-407E-A947-70E740481C1C}">
+                <a14:useLocalDpi xmlns:a14="http://schemas.microsoft.com/office/drawing/2010/main" val="0"/>
+              </a:ext>
+            </a:extLst>
+          </a:blip>
+          <a:stretch>
+            <a:fillRect/>
+          </a:stretch>
+        </p:blipFill>
+        <p:spPr>
+          <a:xfrm>
+            <a:off x="6180133" y="5343184"/>
+            <a:ext cx="2352307" cy="1470192"/>
+          </a:xfrm>
+        </p:spPr>
+      </p:pic>
+      <p:sp>
+        <p:nvSpPr>
+          <p:cNvPr id="5" name="Rectangle 4"/>
+          <p:cNvSpPr>
+            <a:spLocks noGrp="1"/>
+          </p:cNvSpPr>
+          <p:nvPr>
+            <p:ph sz="quarter" idx="15"/>
+          </p:nvPr>
+        </p:nvSpPr>
+        <p:spPr>
+          <a:xfrm>
+            <a:off x="323528" y="1052736"/>
+            <a:ext cx="3744416" cy="5544616"/>
+          </a:xfrm>
+        </p:spPr>
+        <p:txBody>
+          <a:bodyPr>
+            <a:normAutofit/>
+          </a:bodyPr>
+          <a:lstStyle>
+            <a:extLst/>
+          </a:lstStyle>
+          <a:p>
+            <a:pPr marL="342900" marR="0" indent="-342900" algn="l" rtl="0" latinLnBrk="0">
+              <a:spcBef>
+                <a:spcPct val="20000"/>
+              </a:spcBef>
+              <a:buFont typeface="Arial" pitchFamily="34" charset="0"/>
+              <a:buChar char="•"/>
+            </a:pPr>
+            <a:r>
+              <a:rPr lang="sl-SI" sz="1800" dirty="0" smtClean="0"/>
+              <a:t>Vmesnik izdelan v </a:t>
+            </a:r>
+            <a:r>
+              <a:rPr lang="sl-SI" sz="1800" dirty="0" err="1" smtClean="0"/>
+              <a:t>Visual</a:t>
+            </a:r>
+            <a:r>
+              <a:rPr lang="sl-SI" sz="1800" dirty="0" smtClean="0"/>
+              <a:t>  Studio 2010</a:t>
+            </a:r>
+          </a:p>
+          <a:p>
+            <a:pPr marL="342900" marR="0" indent="-342900" algn="l" rtl="0" latinLnBrk="0">
+              <a:spcBef>
+                <a:spcPct val="20000"/>
+              </a:spcBef>
+              <a:buFont typeface="Arial" pitchFamily="34" charset="0"/>
+              <a:buChar char="•"/>
+            </a:pPr>
+            <a:r>
+              <a:rPr lang="sl-SI" sz="1800" dirty="0" smtClean="0"/>
+              <a:t>Orodjarna vsebuje gradnike za risanje,</a:t>
+            </a:r>
+          </a:p>
+          <a:p>
+            <a:pPr marL="1085850" lvl="1" indent="-342900">
+              <a:buFont typeface="Arial" pitchFamily="34" charset="0"/>
+              <a:buChar char="•"/>
+            </a:pPr>
+            <a:r>
+              <a:rPr lang="sl-SI" sz="1800" dirty="0" smtClean="0"/>
+              <a:t>Črta</a:t>
+            </a:r>
+          </a:p>
+          <a:p>
+            <a:pPr marL="1085850" lvl="1" indent="-342900">
+              <a:buFont typeface="Arial" pitchFamily="34" charset="0"/>
+              <a:buChar char="•"/>
+            </a:pPr>
+            <a:r>
+              <a:rPr lang="sl-SI" sz="1800" dirty="0" smtClean="0"/>
+              <a:t>Krožni lok</a:t>
+            </a:r>
+          </a:p>
+          <a:p>
+            <a:pPr marL="1085850" lvl="1" indent="-342900">
+              <a:buFont typeface="Arial" pitchFamily="34" charset="0"/>
+              <a:buChar char="•"/>
+            </a:pPr>
+            <a:r>
+              <a:rPr lang="sl-SI" sz="1800" dirty="0" smtClean="0"/>
+              <a:t>Kvadrat</a:t>
+            </a:r>
+          </a:p>
+          <a:p>
+            <a:pPr marL="1085850" lvl="1" indent="-342900">
+              <a:buFont typeface="Arial" pitchFamily="34" charset="0"/>
+              <a:buChar char="•"/>
+            </a:pPr>
+            <a:r>
+              <a:rPr lang="sl-SI" sz="1800" dirty="0" smtClean="0"/>
+              <a:t>Krog</a:t>
+            </a:r>
+          </a:p>
+          <a:p>
+            <a:pPr marL="342900" indent="-342900">
+              <a:buFont typeface="Arial" pitchFamily="34" charset="0"/>
+              <a:buChar char="•"/>
+            </a:pPr>
+            <a:r>
+              <a:rPr lang="sl-SI" sz="1800" dirty="0" smtClean="0"/>
+              <a:t>t</a:t>
+            </a:r>
+            <a:r>
+              <a:rPr lang="sl-SI" sz="1800" dirty="0" smtClean="0"/>
+              <a:t>er urejanje</a:t>
+            </a:r>
+          </a:p>
+          <a:p>
+            <a:pPr marL="1085850" lvl="1" indent="-342900">
+              <a:buFont typeface="Arial" pitchFamily="34" charset="0"/>
+              <a:buChar char="•"/>
+            </a:pPr>
+            <a:r>
+              <a:rPr lang="sl-SI" sz="1800" dirty="0" smtClean="0"/>
+              <a:t>Premakni</a:t>
+            </a:r>
+          </a:p>
+          <a:p>
+            <a:pPr marL="1085850" lvl="1" indent="-342900">
+              <a:buFont typeface="Arial" pitchFamily="34" charset="0"/>
+              <a:buChar char="•"/>
+            </a:pPr>
+            <a:r>
+              <a:rPr lang="sl-SI" sz="1800" dirty="0" smtClean="0"/>
+              <a:t>Briši</a:t>
+            </a:r>
+          </a:p>
+          <a:p>
+            <a:pPr marL="342900" indent="-342900">
+              <a:buFont typeface="Arial" pitchFamily="34" charset="0"/>
+              <a:buChar char="•"/>
+            </a:pPr>
+            <a:r>
+              <a:rPr lang="sl-SI" sz="1800" dirty="0" smtClean="0"/>
+              <a:t>Omogoča izvoz slike v JBI ali direktno v model</a:t>
+            </a:r>
+            <a:r>
+              <a:rPr lang="sl-SI" sz="1800" dirty="0" smtClean="0"/>
+              <a:t> </a:t>
+            </a:r>
+          </a:p>
+          <a:p>
+            <a:pPr marL="342900" marR="0" indent="-342900" algn="l" rtl="0" latinLnBrk="0">
+              <a:spcBef>
+                <a:spcPct val="20000"/>
+              </a:spcBef>
+              <a:buFont typeface="Arial" pitchFamily="34" charset="0"/>
+              <a:buChar char="•"/>
+            </a:pPr>
+            <a:endParaRPr lang="sl-SI" sz="1800" dirty="0" smtClean="0"/>
+          </a:p>
+        </p:txBody>
+      </p:sp>
+      <p:pic>
+        <p:nvPicPr>
+          <p:cNvPr id="3" name="Picture 2"/>
+          <p:cNvPicPr>
+            <a:picLocks noChangeAspect="1"/>
+          </p:cNvPicPr>
+          <p:nvPr/>
+        </p:nvPicPr>
+        <p:blipFill>
+          <a:blip r:embed="rId4">
+            <a:extLst>
+              <a:ext uri="{28A0092B-C50C-407E-A947-70E740481C1C}">
+                <a14:useLocalDpi xmlns:a14="http://schemas.microsoft.com/office/drawing/2010/main" val="0"/>
+              </a:ext>
+            </a:extLst>
+          </a:blip>
+          <a:stretch>
+            <a:fillRect/>
+          </a:stretch>
+        </p:blipFill>
+        <p:spPr>
+          <a:xfrm>
+            <a:off x="4319433" y="1052736"/>
+            <a:ext cx="3873454" cy="4809399"/>
+          </a:xfrm>
+          <a:prstGeom prst="rect">
+            <a:avLst/>
+          </a:prstGeom>
+        </p:spPr>
+      </p:pic>
+    </p:spTree>
+    <p:extLst>
+      <p:ext uri="{BB962C8B-B14F-4D97-AF65-F5344CB8AC3E}">
+        <p14:creationId xmlns:p14="http://schemas.microsoft.com/office/powerpoint/2010/main" val="992763131"/>
+      </p:ext>
+    </p:extLst>
+  </p:cSld>
+  <p:clrMapOvr>
+    <a:masterClrMapping/>
+  </p:clrMapOvr>
+  <p:timing>
+    <p:tnLst>
+      <p:par>
+        <p:cTn id="1" dur="indefinite" restart="never" nodeType="tmRoot"/>
+      </p:par>
+    </p:tnLst>
+  </p:timing>
+</p:sld>
+</file>
+
+<file path=ppt/slides/slide11.xml><?xml version="1.0" encoding="utf-8"?>
+<p:sld xmlns:a="http://schemas.openxmlformats.org/drawingml/2006/main" xmlns:r="http://schemas.openxmlformats.org/officeDocument/2006/relationships" xmlns:p="http://schemas.openxmlformats.org/presentationml/2006/main">
+  <p:cSld>
+    <p:spTree>
+      <p:nvGrpSpPr>
+        <p:cNvPr id="1" name=""/>
+        <p:cNvGrpSpPr/>
+        <p:nvPr/>
+      </p:nvGrpSpPr>
+      <p:grpSpPr>
+        <a:xfrm>
+          <a:off x="0" y="0"/>
+          <a:ext cx="0" cy="0"/>
+          <a:chOff x="0" y="0"/>
+          <a:chExt cx="0" cy="0"/>
+        </a:xfrm>
+      </p:grpSpPr>
+      <p:sp>
+        <p:nvSpPr>
+          <p:cNvPr id="29" name="Rectangle 2"/>
+          <p:cNvSpPr>
+            <a:spLocks noGrp="1"/>
+          </p:cNvSpPr>
+          <p:nvPr>
+            <p:ph type="title"/>
+          </p:nvPr>
+        </p:nvSpPr>
+        <p:spPr/>
+        <p:txBody>
+          <a:bodyPr>
+            <a:normAutofit fontScale="90000"/>
+          </a:bodyPr>
+          <a:lstStyle>
+            <a:extLst/>
+          </a:lstStyle>
+          <a:p>
+            <a:r>
+              <a:rPr lang="sl-SI" dirty="0" smtClean="0"/>
+              <a:t>Opis simulatorja</a:t>
+            </a:r>
+            <a:endParaRPr lang="en-US" dirty="0"/>
+          </a:p>
+        </p:txBody>
+      </p:sp>
+      <p:sp>
+        <p:nvSpPr>
+          <p:cNvPr id="2" name="Rectangle 3"/>
+          <p:cNvSpPr>
+            <a:spLocks noGrp="1"/>
+          </p:cNvSpPr>
+          <p:nvPr>
+            <p:ph type="body" sz="quarter" idx="13"/>
+          </p:nvPr>
+        </p:nvSpPr>
+        <p:spPr>
+          <a:xfrm>
+            <a:off x="304800" y="381000"/>
+            <a:ext cx="8077200" cy="599728"/>
+          </a:xfrm>
+        </p:spPr>
+        <p:txBody>
+          <a:bodyPr>
+            <a:noAutofit/>
+          </a:bodyPr>
+          <a:lstStyle>
+            <a:extLst/>
+          </a:lstStyle>
+          <a:p>
+            <a:r>
+              <a:rPr lang="sl-SI" sz="3600" dirty="0" smtClean="0"/>
+              <a:t>Rezkar - 2</a:t>
+            </a:r>
+            <a:endParaRPr lang="en-US" sz="3600" dirty="0"/>
+          </a:p>
+        </p:txBody>
+      </p:sp>
+      <p:pic>
+        <p:nvPicPr>
+          <p:cNvPr id="12" name="Content Placeholder 11"/>
+          <p:cNvPicPr>
+            <a:picLocks noGrp="1" noChangeAspect="1"/>
+          </p:cNvPicPr>
+          <p:nvPr>
+            <p:ph sz="quarter" idx="15"/>
+          </p:nvPr>
+        </p:nvPicPr>
+        <p:blipFill>
+          <a:blip r:embed="rId3" cstate="print">
+            <a:extLst>
+              <a:ext uri="{28A0092B-C50C-407E-A947-70E740481C1C}">
+                <a14:useLocalDpi xmlns:a14="http://schemas.microsoft.com/office/drawing/2010/main" val="0"/>
+              </a:ext>
+            </a:extLst>
+          </a:blip>
+          <a:stretch>
+            <a:fillRect/>
+          </a:stretch>
+        </p:blipFill>
+        <p:spPr>
+          <a:xfrm>
+            <a:off x="6180133" y="5343184"/>
+            <a:ext cx="2352307" cy="1470192"/>
+          </a:xfrm>
+        </p:spPr>
+      </p:pic>
+      <p:sp>
+        <p:nvSpPr>
+          <p:cNvPr id="5" name="Rectangle 4"/>
+          <p:cNvSpPr>
+            <a:spLocks noGrp="1"/>
+          </p:cNvSpPr>
+          <p:nvPr>
+            <p:ph sz="quarter" idx="15"/>
+          </p:nvPr>
+        </p:nvSpPr>
+        <p:spPr>
+          <a:xfrm>
+            <a:off x="323528" y="1052736"/>
+            <a:ext cx="7416824" cy="648072"/>
+          </a:xfrm>
+        </p:spPr>
+        <p:txBody>
+          <a:bodyPr>
+            <a:normAutofit/>
+          </a:bodyPr>
+          <a:lstStyle>
+            <a:extLst/>
+          </a:lstStyle>
+          <a:p>
+            <a:pPr marR="0" algn="l" rtl="0" latinLnBrk="0">
+              <a:spcBef>
+                <a:spcPct val="20000"/>
+              </a:spcBef>
+            </a:pPr>
+            <a:r>
+              <a:rPr lang="sl-SI" sz="1800" dirty="0"/>
+              <a:t> </a:t>
+            </a:r>
+            <a:r>
+              <a:rPr lang="sl-SI" sz="1800" dirty="0" smtClean="0"/>
+              <a:t>                       </a:t>
+            </a:r>
+            <a:r>
+              <a:rPr lang="sl-SI" sz="1800" dirty="0" smtClean="0"/>
+              <a:t>Nastavitve </a:t>
+            </a:r>
+            <a:r>
+              <a:rPr lang="sl-SI" sz="1800" dirty="0" err="1" smtClean="0"/>
+              <a:t>rezkanja	</a:t>
+            </a:r>
+            <a:r>
+              <a:rPr lang="sl-SI" sz="1800" dirty="0" err="1"/>
+              <a:t>	</a:t>
+            </a:r>
+            <a:r>
+              <a:rPr lang="sl-SI" sz="1800" dirty="0" err="1" smtClean="0"/>
+              <a:t>Možnosti</a:t>
+            </a:r>
+            <a:r>
+              <a:rPr lang="sl-SI" sz="1800" dirty="0" smtClean="0"/>
+              <a:t> izvoza datoteke</a:t>
+            </a:r>
+          </a:p>
+          <a:p>
+            <a:pPr marL="342900" marR="0" indent="-342900" algn="l" rtl="0" latinLnBrk="0">
+              <a:spcBef>
+                <a:spcPct val="20000"/>
+              </a:spcBef>
+              <a:buFont typeface="Arial" pitchFamily="34" charset="0"/>
+              <a:buChar char="•"/>
+            </a:pPr>
+            <a:endParaRPr lang="sl-SI" sz="1800" dirty="0" smtClean="0"/>
+          </a:p>
+        </p:txBody>
+      </p:sp>
+      <p:pic>
+        <p:nvPicPr>
+          <p:cNvPr id="3" name="Picture 2"/>
+          <p:cNvPicPr>
+            <a:picLocks noChangeAspect="1"/>
+          </p:cNvPicPr>
+          <p:nvPr/>
+        </p:nvPicPr>
+        <p:blipFill>
+          <a:blip r:embed="rId4">
+            <a:extLst>
+              <a:ext uri="{28A0092B-C50C-407E-A947-70E740481C1C}">
+                <a14:useLocalDpi xmlns:a14="http://schemas.microsoft.com/office/drawing/2010/main" val="0"/>
+              </a:ext>
+            </a:extLst>
+          </a:blip>
+          <a:stretch>
+            <a:fillRect/>
+          </a:stretch>
+        </p:blipFill>
+        <p:spPr>
+          <a:xfrm>
+            <a:off x="683568" y="1484783"/>
+            <a:ext cx="3873454" cy="4428195"/>
+          </a:xfrm>
+          <a:prstGeom prst="rect">
+            <a:avLst/>
+          </a:prstGeom>
+        </p:spPr>
+      </p:pic>
+      <p:pic>
+        <p:nvPicPr>
+          <p:cNvPr id="4" name="Picture 3"/>
+          <p:cNvPicPr>
+            <a:picLocks noChangeAspect="1"/>
+          </p:cNvPicPr>
+          <p:nvPr/>
+        </p:nvPicPr>
+        <p:blipFill>
+          <a:blip r:embed="rId5">
+            <a:extLst>
+              <a:ext uri="{28A0092B-C50C-407E-A947-70E740481C1C}">
+                <a14:useLocalDpi xmlns:a14="http://schemas.microsoft.com/office/drawing/2010/main" val="0"/>
+              </a:ext>
+            </a:extLst>
+          </a:blip>
+          <a:stretch>
+            <a:fillRect/>
+          </a:stretch>
+        </p:blipFill>
+        <p:spPr>
+          <a:xfrm>
+            <a:off x="5220072" y="1497179"/>
+            <a:ext cx="1905266" cy="876422"/>
+          </a:xfrm>
+          <a:prstGeom prst="rect">
+            <a:avLst/>
+          </a:prstGeom>
+        </p:spPr>
+      </p:pic>
+    </p:spTree>
+    <p:extLst>
+      <p:ext uri="{BB962C8B-B14F-4D97-AF65-F5344CB8AC3E}">
+        <p14:creationId xmlns:p14="http://schemas.microsoft.com/office/powerpoint/2010/main" val="2064875819"/>
+      </p:ext>
+    </p:extLst>
+  </p:cSld>
+  <p:clrMapOvr>
+    <a:masterClrMapping/>
+  </p:clrMapOvr>
+  <p:timing>
+    <p:tnLst>
+      <p:par>
+        <p:cTn id="1" dur="indefinite" restart="never" nodeType="tmRoot"/>
+      </p:par>
+    </p:tnLst>
+  </p:timing>
+</p:sld>
+</file>
+
+<file path=ppt/slides/slide12.xml><?xml version="1.0" encoding="utf-8"?>
+<p:sld xmlns:a="http://schemas.openxmlformats.org/drawingml/2006/main" xmlns:r="http://schemas.openxmlformats.org/officeDocument/2006/relationships" xmlns:p="http://schemas.openxmlformats.org/presentationml/2006/main">
+  <p:cSld>
+    <p:spTree>
+      <p:nvGrpSpPr>
+        <p:cNvPr id="1" name=""/>
+        <p:cNvGrpSpPr/>
+        <p:nvPr/>
+      </p:nvGrpSpPr>
+      <p:grpSpPr>
+        <a:xfrm>
+          <a:off x="0" y="0"/>
+          <a:ext cx="0" cy="0"/>
+          <a:chOff x="0" y="0"/>
+          <a:chExt cx="0" cy="0"/>
+        </a:xfrm>
+      </p:grpSpPr>
+      <p:sp>
+        <p:nvSpPr>
+          <p:cNvPr id="29" name="Rectangle 2"/>
+          <p:cNvSpPr>
+            <a:spLocks noGrp="1"/>
+          </p:cNvSpPr>
+          <p:nvPr>
+            <p:ph type="title"/>
+          </p:nvPr>
+        </p:nvSpPr>
+        <p:spPr/>
+        <p:txBody>
+          <a:bodyPr>
+            <a:normAutofit fontScale="90000"/>
+          </a:bodyPr>
+          <a:lstStyle>
+            <a:extLst/>
+          </a:lstStyle>
+          <a:p>
+            <a:r>
+              <a:rPr lang="sl-SI" dirty="0" smtClean="0"/>
+              <a:t>Opis simulatorja</a:t>
+            </a:r>
+            <a:endParaRPr lang="en-US" dirty="0"/>
+          </a:p>
+        </p:txBody>
+      </p:sp>
+      <p:sp>
+        <p:nvSpPr>
+          <p:cNvPr id="2" name="Rectangle 3"/>
+          <p:cNvSpPr>
+            <a:spLocks noGrp="1"/>
+          </p:cNvSpPr>
+          <p:nvPr>
+            <p:ph type="body" sz="quarter" idx="13"/>
+          </p:nvPr>
+        </p:nvSpPr>
+        <p:spPr>
+          <a:xfrm>
+            <a:off x="304800" y="381000"/>
+            <a:ext cx="8077200" cy="599728"/>
+          </a:xfrm>
+        </p:spPr>
+        <p:txBody>
+          <a:bodyPr>
+            <a:noAutofit/>
+          </a:bodyPr>
+          <a:lstStyle>
+            <a:extLst/>
+          </a:lstStyle>
+          <a:p>
+            <a:r>
+              <a:rPr lang="sl-SI" sz="3600" dirty="0" smtClean="0"/>
+              <a:t>Jezik robota</a:t>
+            </a:r>
+            <a:endParaRPr lang="en-US" sz="3600" dirty="0"/>
+          </a:p>
+        </p:txBody>
+      </p:sp>
+      <p:pic>
+        <p:nvPicPr>
+          <p:cNvPr id="12" name="Content Placeholder 11"/>
+          <p:cNvPicPr>
+            <a:picLocks noGrp="1" noChangeAspect="1"/>
+          </p:cNvPicPr>
+          <p:nvPr>
+            <p:ph sz="quarter" idx="15"/>
+          </p:nvPr>
+        </p:nvPicPr>
+        <p:blipFill>
+          <a:blip r:embed="rId3" cstate="print">
+            <a:extLst>
+              <a:ext uri="{28A0092B-C50C-407E-A947-70E740481C1C}">
+                <a14:useLocalDpi xmlns:a14="http://schemas.microsoft.com/office/drawing/2010/main" val="0"/>
+              </a:ext>
+            </a:extLst>
+          </a:blip>
+          <a:stretch>
+            <a:fillRect/>
+          </a:stretch>
+        </p:blipFill>
+        <p:spPr>
+          <a:xfrm>
+            <a:off x="6180133" y="5343184"/>
+            <a:ext cx="2352307" cy="1470192"/>
+          </a:xfrm>
+        </p:spPr>
+      </p:pic>
+      <p:sp>
+        <p:nvSpPr>
+          <p:cNvPr id="5" name="Rectangle 4"/>
+          <p:cNvSpPr>
+            <a:spLocks noGrp="1"/>
+          </p:cNvSpPr>
+          <p:nvPr>
+            <p:ph sz="quarter" idx="15"/>
+          </p:nvPr>
+        </p:nvSpPr>
+        <p:spPr>
+          <a:xfrm>
+            <a:off x="323528" y="1052736"/>
+            <a:ext cx="8064896" cy="3024336"/>
+          </a:xfrm>
+        </p:spPr>
+        <p:txBody>
+          <a:bodyPr>
+            <a:normAutofit/>
+          </a:bodyPr>
+          <a:lstStyle>
+            <a:extLst/>
+          </a:lstStyle>
+          <a:p>
+            <a:pPr marL="342900" marR="0" indent="-342900" algn="l" rtl="0" latinLnBrk="0">
+              <a:spcBef>
+                <a:spcPct val="20000"/>
+              </a:spcBef>
+              <a:buFont typeface="Arial" pitchFamily="34" charset="0"/>
+              <a:buChar char="•"/>
+            </a:pPr>
+            <a:r>
+              <a:rPr lang="sl-SI" sz="1800" dirty="0" smtClean="0"/>
+              <a:t>Izdelan v </a:t>
+            </a:r>
+            <a:r>
+              <a:rPr lang="sl-SI" sz="1800" dirty="0" err="1" smtClean="0"/>
+              <a:t>ANTLRWorks</a:t>
+            </a:r>
+            <a:endParaRPr lang="sl-SI" sz="1800" dirty="0"/>
+          </a:p>
+          <a:p>
+            <a:pPr marL="342900" marR="0" indent="-342900" algn="l" rtl="0" latinLnBrk="0">
+              <a:spcBef>
+                <a:spcPct val="20000"/>
+              </a:spcBef>
+              <a:buFont typeface="Arial" pitchFamily="34" charset="0"/>
+              <a:buChar char="•"/>
+            </a:pPr>
+            <a:r>
+              <a:rPr lang="sl-SI" sz="1800" dirty="0" smtClean="0"/>
+              <a:t>Sestavljen iz leksikalnega analizatorja, semantičnega analizatorja in funkcije za ovrednotenje ukazov</a:t>
+            </a:r>
+          </a:p>
+          <a:p>
+            <a:pPr marL="342900" marR="0" indent="-342900" algn="l" rtl="0" latinLnBrk="0">
+              <a:spcBef>
+                <a:spcPct val="20000"/>
+              </a:spcBef>
+              <a:buFont typeface="Arial" pitchFamily="34" charset="0"/>
+              <a:buChar char="•"/>
+            </a:pPr>
+            <a:r>
+              <a:rPr lang="sl-SI" sz="1800" dirty="0" smtClean="0"/>
+              <a:t>Uporaba v </a:t>
+            </a:r>
+            <a:r>
+              <a:rPr lang="sl-SI" sz="1800" dirty="0" err="1" smtClean="0"/>
+              <a:t>Visual</a:t>
+            </a:r>
+            <a:r>
+              <a:rPr lang="sl-SI" sz="1800" dirty="0" smtClean="0"/>
+              <a:t> Studio:</a:t>
+            </a:r>
+            <a:endParaRPr lang="sl-SI" sz="1800" dirty="0" smtClean="0"/>
+          </a:p>
+          <a:p>
+            <a:pPr marL="1085850" lvl="1" indent="-342900">
+              <a:buFont typeface="Arial" pitchFamily="34" charset="0"/>
+              <a:buChar char="•"/>
+            </a:pPr>
+            <a:r>
+              <a:rPr lang="sl-SI" sz="1800" dirty="0" smtClean="0"/>
+              <a:t>Uvoz razredov </a:t>
+            </a:r>
+            <a:r>
+              <a:rPr lang="sl-SI" sz="1800" dirty="0" err="1" smtClean="0"/>
+              <a:t>RobotLanguageParser.cs</a:t>
+            </a:r>
+            <a:r>
+              <a:rPr lang="sl-SI" sz="1800" dirty="0" smtClean="0"/>
+              <a:t> in </a:t>
+            </a:r>
+            <a:r>
+              <a:rPr lang="sl-SI" sz="1800" dirty="0" err="1"/>
+              <a:t>RobotLanguageLexer.cs</a:t>
+            </a:r>
+            <a:endParaRPr lang="sl-SI" sz="1800" dirty="0" smtClean="0"/>
+          </a:p>
+          <a:p>
+            <a:pPr marL="1085850" lvl="1" indent="-342900">
+              <a:buFont typeface="Arial" pitchFamily="34" charset="0"/>
+              <a:buChar char="•"/>
+            </a:pPr>
+            <a:r>
+              <a:rPr lang="sl-SI" sz="1800" dirty="0" smtClean="0"/>
+              <a:t>Uporaba ANTLR knjižnice </a:t>
+            </a:r>
+            <a:r>
+              <a:rPr lang="sl-SI" sz="1800" dirty="0" err="1" smtClean="0"/>
+              <a:t>Antlr3.Runtime.dll</a:t>
+            </a:r>
+            <a:endParaRPr lang="sl-SI" sz="1800" dirty="0" smtClean="0"/>
+          </a:p>
+        </p:txBody>
+      </p:sp>
+      <p:pic>
+        <p:nvPicPr>
+          <p:cNvPr id="7" name="Picture 6"/>
+          <p:cNvPicPr>
+            <a:picLocks noChangeAspect="1"/>
+          </p:cNvPicPr>
+          <p:nvPr/>
+        </p:nvPicPr>
+        <p:blipFill>
+          <a:blip r:embed="rId4">
+            <a:extLst>
+              <a:ext uri="{28A0092B-C50C-407E-A947-70E740481C1C}">
+                <a14:useLocalDpi xmlns:a14="http://schemas.microsoft.com/office/drawing/2010/main" val="0"/>
+              </a:ext>
+            </a:extLst>
+          </a:blip>
+          <a:stretch>
+            <a:fillRect/>
+          </a:stretch>
+        </p:blipFill>
+        <p:spPr>
+          <a:xfrm>
+            <a:off x="755576" y="3284983"/>
+            <a:ext cx="7272808" cy="3451667"/>
+          </a:xfrm>
+          <a:prstGeom prst="rect">
+            <a:avLst/>
+          </a:prstGeom>
+        </p:spPr>
+      </p:pic>
+    </p:spTree>
+    <p:extLst>
+      <p:ext uri="{BB962C8B-B14F-4D97-AF65-F5344CB8AC3E}">
+        <p14:creationId xmlns:p14="http://schemas.microsoft.com/office/powerpoint/2010/main" val="3476578919"/>
+      </p:ext>
+    </p:extLst>
+  </p:cSld>
+  <p:clrMapOvr>
+    <a:masterClrMapping/>
+  </p:clrMapOvr>
+  <p:timing>
+    <p:tnLst>
+      <p:par>
+        <p:cTn id="1" dur="indefinite" restart="never" nodeType="tmRoot"/>
+      </p:par>
+    </p:tnLst>
+  </p:timing>
+</p:sld>
+</file>
+
 <file path=ppt/slides/slide2.xml><?xml version="1.0" encoding="utf-8"?>
 <p:sld xmlns:a="http://schemas.openxmlformats.org/drawingml/2006/main" xmlns:r="http://schemas.openxmlformats.org/officeDocument/2006/relationships" xmlns:p="http://schemas.openxmlformats.org/presentationml/2006/main">
   <p:cSld>
@@ -10465,7 +11558,7 @@
             </a:pPr>
             <a:r>
               <a:rPr lang="sl-SI" sz="1800" dirty="0" smtClean="0"/>
-              <a:t>Večinski delež implementacije opravljen „</a:t>
+              <a:t>Večinski delež (90+ %) implementacije opravljen „</a:t>
             </a:r>
             <a:r>
               <a:rPr lang="sl-SI" sz="1800" dirty="0" err="1" smtClean="0"/>
@@ -10483,7 +11576,16 @@
               <a:rPr lang="sl-SI" sz="1800" dirty="0" smtClean="0"/>
               <a:t>“ </a:t>
             </a:r>
-            <a:endParaRPr lang="sl-SI" sz="1800" dirty="0" smtClean="0"/>
+          </a:p>
+          <a:p>
+            <a:pPr marL="342900" indent="-342900">
+              <a:buFont typeface="Arial" pitchFamily="34" charset="0"/>
+              <a:buChar char="•"/>
+            </a:pPr>
+            <a:r>
+              <a:rPr lang="sl-SI" sz="1800" dirty="0" smtClean="0"/>
+              <a:t>Poudarek na uporabniku prijazen vmesnik</a:t>
+            </a:r>
           </a:p>
         </p:txBody>
       </p:sp>

</xml_diff>

<commit_message>
Dodana preostala poglavja - V1.0
</commit_message>
<xml_diff>
--- a/Robot_simulator/Dokumentacija/MotomanPredstavitev.pptx
+++ b/Robot_simulator/Dokumentacija/MotomanPredstavitev.pptx
@@ -5,10 +5,10 @@
     <p:sldMasterId id="2147483648" r:id="rId1"/>
   </p:sldMasterIdLst>
   <p:notesMasterIdLst>
-    <p:notesMasterId r:id="rId14"/>
+    <p:notesMasterId r:id="rId21"/>
   </p:notesMasterIdLst>
   <p:handoutMasterIdLst>
-    <p:handoutMasterId r:id="rId15"/>
+    <p:handoutMasterId r:id="rId22"/>
   </p:handoutMasterIdLst>
   <p:sldIdLst>
     <p:sldId id="256" r:id="rId2"/>
@@ -23,6 +23,13 @@
     <p:sldId id="290" r:id="rId11"/>
     <p:sldId id="291" r:id="rId12"/>
     <p:sldId id="292" r:id="rId13"/>
+    <p:sldId id="293" r:id="rId14"/>
+    <p:sldId id="294" r:id="rId15"/>
+    <p:sldId id="295" r:id="rId16"/>
+    <p:sldId id="296" r:id="rId17"/>
+    <p:sldId id="297" r:id="rId18"/>
+    <p:sldId id="298" r:id="rId19"/>
+    <p:sldId id="299" r:id="rId20"/>
   </p:sldIdLst>
   <p:sldSz cx="9144000" cy="6858000" type="screen4x3"/>
   <p:notesSz cx="6858000" cy="9144000"/>
@@ -956,6 +963,594 @@
               <a:rPr lang="en-US" smtClean="0"/>
               <a:pPr/>
               <a:t>12</a:t>
+            </a:fld>
+            <a:endParaRPr lang="en-US"/>
+          </a:p>
+        </p:txBody>
+      </p:sp>
+    </p:spTree>
+  </p:cSld>
+  <p:clrMapOvr>
+    <a:masterClrMapping/>
+  </p:clrMapOvr>
+</p:notes>
+</file>
+
+<file path=ppt/notesSlides/notesSlide13.xml><?xml version="1.0" encoding="utf-8"?>
+<p:notes xmlns:a="http://schemas.openxmlformats.org/drawingml/2006/main" xmlns:r="http://schemas.openxmlformats.org/officeDocument/2006/relationships" xmlns:p="http://schemas.openxmlformats.org/presentationml/2006/main">
+  <p:cSld>
+    <p:spTree>
+      <p:nvGrpSpPr>
+        <p:cNvPr id="1" name=""/>
+        <p:cNvGrpSpPr/>
+        <p:nvPr/>
+      </p:nvGrpSpPr>
+      <p:grpSpPr>
+        <a:xfrm>
+          <a:off x="0" y="0"/>
+          <a:ext cx="0" cy="0"/>
+          <a:chOff x="0" y="0"/>
+          <a:chExt cx="0" cy="0"/>
+        </a:xfrm>
+      </p:grpSpPr>
+      <p:sp>
+        <p:nvSpPr>
+          <p:cNvPr id="2" name="Rectangle 2"/>
+          <p:cNvSpPr>
+            <a:spLocks noGrp="1" noRot="1" noChangeAspect="1"/>
+          </p:cNvSpPr>
+          <p:nvPr>
+            <p:ph type="sldImg"/>
+          </p:nvPr>
+        </p:nvSpPr>
+        <p:spPr/>
+      </p:sp>
+      <p:sp>
+        <p:nvSpPr>
+          <p:cNvPr id="3" name="Rectangle 3"/>
+          <p:cNvSpPr>
+            <a:spLocks noGrp="1"/>
+          </p:cNvSpPr>
+          <p:nvPr>
+            <p:ph type="body" idx="1"/>
+          </p:nvPr>
+        </p:nvSpPr>
+        <p:spPr/>
+        <p:txBody>
+          <a:bodyPr/>
+          <a:lstStyle>
+            <a:extLst/>
+          </a:lstStyle>
+          <a:p>
+            <a:endParaRPr lang="en-US"/>
+          </a:p>
+        </p:txBody>
+      </p:sp>
+      <p:sp>
+        <p:nvSpPr>
+          <p:cNvPr id="4" name="Rectangle 4"/>
+          <p:cNvSpPr>
+            <a:spLocks noGrp="1"/>
+          </p:cNvSpPr>
+          <p:nvPr>
+            <p:ph type="sldNum" sz="quarter" idx="10"/>
+          </p:nvPr>
+        </p:nvSpPr>
+        <p:spPr/>
+        <p:txBody>
+          <a:bodyPr/>
+          <a:lstStyle>
+            <a:extLst/>
+          </a:lstStyle>
+          <a:p>
+            <a:fld id="{B3A019F3-8596-4028-9847-CBD3A185B07A}" type="slidenum">
+              <a:rPr lang="en-US" smtClean="0"/>
+              <a:pPr/>
+              <a:t>13</a:t>
+            </a:fld>
+            <a:endParaRPr lang="en-US"/>
+          </a:p>
+        </p:txBody>
+      </p:sp>
+    </p:spTree>
+  </p:cSld>
+  <p:clrMapOvr>
+    <a:masterClrMapping/>
+  </p:clrMapOvr>
+</p:notes>
+</file>
+
+<file path=ppt/notesSlides/notesSlide14.xml><?xml version="1.0" encoding="utf-8"?>
+<p:notes xmlns:a="http://schemas.openxmlformats.org/drawingml/2006/main" xmlns:r="http://schemas.openxmlformats.org/officeDocument/2006/relationships" xmlns:p="http://schemas.openxmlformats.org/presentationml/2006/main">
+  <p:cSld>
+    <p:spTree>
+      <p:nvGrpSpPr>
+        <p:cNvPr id="1" name=""/>
+        <p:cNvGrpSpPr/>
+        <p:nvPr/>
+      </p:nvGrpSpPr>
+      <p:grpSpPr>
+        <a:xfrm>
+          <a:off x="0" y="0"/>
+          <a:ext cx="0" cy="0"/>
+          <a:chOff x="0" y="0"/>
+          <a:chExt cx="0" cy="0"/>
+        </a:xfrm>
+      </p:grpSpPr>
+      <p:sp>
+        <p:nvSpPr>
+          <p:cNvPr id="2" name="Rectangle 2"/>
+          <p:cNvSpPr>
+            <a:spLocks noGrp="1" noRot="1" noChangeAspect="1"/>
+          </p:cNvSpPr>
+          <p:nvPr>
+            <p:ph type="sldImg"/>
+          </p:nvPr>
+        </p:nvSpPr>
+        <p:spPr/>
+      </p:sp>
+      <p:sp>
+        <p:nvSpPr>
+          <p:cNvPr id="3" name="Rectangle 3"/>
+          <p:cNvSpPr>
+            <a:spLocks noGrp="1"/>
+          </p:cNvSpPr>
+          <p:nvPr>
+            <p:ph type="body" idx="1"/>
+          </p:nvPr>
+        </p:nvSpPr>
+        <p:spPr/>
+        <p:txBody>
+          <a:bodyPr/>
+          <a:lstStyle>
+            <a:extLst/>
+          </a:lstStyle>
+          <a:p>
+            <a:endParaRPr lang="en-US"/>
+          </a:p>
+        </p:txBody>
+      </p:sp>
+      <p:sp>
+        <p:nvSpPr>
+          <p:cNvPr id="4" name="Rectangle 4"/>
+          <p:cNvSpPr>
+            <a:spLocks noGrp="1"/>
+          </p:cNvSpPr>
+          <p:nvPr>
+            <p:ph type="sldNum" sz="quarter" idx="10"/>
+          </p:nvPr>
+        </p:nvSpPr>
+        <p:spPr/>
+        <p:txBody>
+          <a:bodyPr/>
+          <a:lstStyle>
+            <a:extLst/>
+          </a:lstStyle>
+          <a:p>
+            <a:fld id="{B3A019F3-8596-4028-9847-CBD3A185B07A}" type="slidenum">
+              <a:rPr lang="en-US" smtClean="0"/>
+              <a:pPr/>
+              <a:t>14</a:t>
+            </a:fld>
+            <a:endParaRPr lang="en-US"/>
+          </a:p>
+        </p:txBody>
+      </p:sp>
+    </p:spTree>
+  </p:cSld>
+  <p:clrMapOvr>
+    <a:masterClrMapping/>
+  </p:clrMapOvr>
+</p:notes>
+</file>
+
+<file path=ppt/notesSlides/notesSlide15.xml><?xml version="1.0" encoding="utf-8"?>
+<p:notes xmlns:a="http://schemas.openxmlformats.org/drawingml/2006/main" xmlns:r="http://schemas.openxmlformats.org/officeDocument/2006/relationships" xmlns:p="http://schemas.openxmlformats.org/presentationml/2006/main">
+  <p:cSld>
+    <p:spTree>
+      <p:nvGrpSpPr>
+        <p:cNvPr id="1" name=""/>
+        <p:cNvGrpSpPr/>
+        <p:nvPr/>
+      </p:nvGrpSpPr>
+      <p:grpSpPr>
+        <a:xfrm>
+          <a:off x="0" y="0"/>
+          <a:ext cx="0" cy="0"/>
+          <a:chOff x="0" y="0"/>
+          <a:chExt cx="0" cy="0"/>
+        </a:xfrm>
+      </p:grpSpPr>
+      <p:sp>
+        <p:nvSpPr>
+          <p:cNvPr id="2" name="Rectangle 2"/>
+          <p:cNvSpPr>
+            <a:spLocks noGrp="1" noRot="1" noChangeAspect="1"/>
+          </p:cNvSpPr>
+          <p:nvPr>
+            <p:ph type="sldImg"/>
+          </p:nvPr>
+        </p:nvSpPr>
+        <p:spPr/>
+      </p:sp>
+      <p:sp>
+        <p:nvSpPr>
+          <p:cNvPr id="3" name="Rectangle 3"/>
+          <p:cNvSpPr>
+            <a:spLocks noGrp="1"/>
+          </p:cNvSpPr>
+          <p:nvPr>
+            <p:ph type="body" idx="1"/>
+          </p:nvPr>
+        </p:nvSpPr>
+        <p:spPr/>
+        <p:txBody>
+          <a:bodyPr/>
+          <a:lstStyle>
+            <a:extLst/>
+          </a:lstStyle>
+          <a:p>
+            <a:endParaRPr lang="en-US"/>
+          </a:p>
+        </p:txBody>
+      </p:sp>
+      <p:sp>
+        <p:nvSpPr>
+          <p:cNvPr id="4" name="Rectangle 4"/>
+          <p:cNvSpPr>
+            <a:spLocks noGrp="1"/>
+          </p:cNvSpPr>
+          <p:nvPr>
+            <p:ph type="sldNum" sz="quarter" idx="10"/>
+          </p:nvPr>
+        </p:nvSpPr>
+        <p:spPr/>
+        <p:txBody>
+          <a:bodyPr/>
+          <a:lstStyle>
+            <a:extLst/>
+          </a:lstStyle>
+          <a:p>
+            <a:fld id="{B3A019F3-8596-4028-9847-CBD3A185B07A}" type="slidenum">
+              <a:rPr lang="en-US" smtClean="0"/>
+              <a:pPr/>
+              <a:t>15</a:t>
+            </a:fld>
+            <a:endParaRPr lang="en-US"/>
+          </a:p>
+        </p:txBody>
+      </p:sp>
+    </p:spTree>
+  </p:cSld>
+  <p:clrMapOvr>
+    <a:masterClrMapping/>
+  </p:clrMapOvr>
+</p:notes>
+</file>
+
+<file path=ppt/notesSlides/notesSlide16.xml><?xml version="1.0" encoding="utf-8"?>
+<p:notes xmlns:a="http://schemas.openxmlformats.org/drawingml/2006/main" xmlns:r="http://schemas.openxmlformats.org/officeDocument/2006/relationships" xmlns:p="http://schemas.openxmlformats.org/presentationml/2006/main">
+  <p:cSld>
+    <p:spTree>
+      <p:nvGrpSpPr>
+        <p:cNvPr id="1" name=""/>
+        <p:cNvGrpSpPr/>
+        <p:nvPr/>
+      </p:nvGrpSpPr>
+      <p:grpSpPr>
+        <a:xfrm>
+          <a:off x="0" y="0"/>
+          <a:ext cx="0" cy="0"/>
+          <a:chOff x="0" y="0"/>
+          <a:chExt cx="0" cy="0"/>
+        </a:xfrm>
+      </p:grpSpPr>
+      <p:sp>
+        <p:nvSpPr>
+          <p:cNvPr id="2" name="Rectangle 2"/>
+          <p:cNvSpPr>
+            <a:spLocks noGrp="1" noRot="1" noChangeAspect="1"/>
+          </p:cNvSpPr>
+          <p:nvPr>
+            <p:ph type="sldImg"/>
+          </p:nvPr>
+        </p:nvSpPr>
+        <p:spPr/>
+      </p:sp>
+      <p:sp>
+        <p:nvSpPr>
+          <p:cNvPr id="3" name="Rectangle 3"/>
+          <p:cNvSpPr>
+            <a:spLocks noGrp="1"/>
+          </p:cNvSpPr>
+          <p:nvPr>
+            <p:ph type="body" idx="1"/>
+          </p:nvPr>
+        </p:nvSpPr>
+        <p:spPr/>
+        <p:txBody>
+          <a:bodyPr/>
+          <a:lstStyle>
+            <a:extLst/>
+          </a:lstStyle>
+          <a:p>
+            <a:endParaRPr lang="en-US"/>
+          </a:p>
+        </p:txBody>
+      </p:sp>
+      <p:sp>
+        <p:nvSpPr>
+          <p:cNvPr id="4" name="Rectangle 4"/>
+          <p:cNvSpPr>
+            <a:spLocks noGrp="1"/>
+          </p:cNvSpPr>
+          <p:nvPr>
+            <p:ph type="sldNum" sz="quarter" idx="10"/>
+          </p:nvPr>
+        </p:nvSpPr>
+        <p:spPr/>
+        <p:txBody>
+          <a:bodyPr/>
+          <a:lstStyle>
+            <a:extLst/>
+          </a:lstStyle>
+          <a:p>
+            <a:fld id="{B3A019F3-8596-4028-9847-CBD3A185B07A}" type="slidenum">
+              <a:rPr lang="en-US" smtClean="0"/>
+              <a:pPr/>
+              <a:t>16</a:t>
+            </a:fld>
+            <a:endParaRPr lang="en-US"/>
+          </a:p>
+        </p:txBody>
+      </p:sp>
+    </p:spTree>
+  </p:cSld>
+  <p:clrMapOvr>
+    <a:masterClrMapping/>
+  </p:clrMapOvr>
+</p:notes>
+</file>
+
+<file path=ppt/notesSlides/notesSlide17.xml><?xml version="1.0" encoding="utf-8"?>
+<p:notes xmlns:a="http://schemas.openxmlformats.org/drawingml/2006/main" xmlns:r="http://schemas.openxmlformats.org/officeDocument/2006/relationships" xmlns:p="http://schemas.openxmlformats.org/presentationml/2006/main">
+  <p:cSld>
+    <p:spTree>
+      <p:nvGrpSpPr>
+        <p:cNvPr id="1" name=""/>
+        <p:cNvGrpSpPr/>
+        <p:nvPr/>
+      </p:nvGrpSpPr>
+      <p:grpSpPr>
+        <a:xfrm>
+          <a:off x="0" y="0"/>
+          <a:ext cx="0" cy="0"/>
+          <a:chOff x="0" y="0"/>
+          <a:chExt cx="0" cy="0"/>
+        </a:xfrm>
+      </p:grpSpPr>
+      <p:sp>
+        <p:nvSpPr>
+          <p:cNvPr id="2" name="Rectangle 2"/>
+          <p:cNvSpPr>
+            <a:spLocks noGrp="1" noRot="1" noChangeAspect="1"/>
+          </p:cNvSpPr>
+          <p:nvPr>
+            <p:ph type="sldImg"/>
+          </p:nvPr>
+        </p:nvSpPr>
+        <p:spPr/>
+      </p:sp>
+      <p:sp>
+        <p:nvSpPr>
+          <p:cNvPr id="3" name="Rectangle 3"/>
+          <p:cNvSpPr>
+            <a:spLocks noGrp="1"/>
+          </p:cNvSpPr>
+          <p:nvPr>
+            <p:ph type="body" idx="1"/>
+          </p:nvPr>
+        </p:nvSpPr>
+        <p:spPr/>
+        <p:txBody>
+          <a:bodyPr/>
+          <a:lstStyle>
+            <a:extLst/>
+          </a:lstStyle>
+          <a:p>
+            <a:endParaRPr lang="en-US"/>
+          </a:p>
+        </p:txBody>
+      </p:sp>
+      <p:sp>
+        <p:nvSpPr>
+          <p:cNvPr id="4" name="Rectangle 4"/>
+          <p:cNvSpPr>
+            <a:spLocks noGrp="1"/>
+          </p:cNvSpPr>
+          <p:nvPr>
+            <p:ph type="sldNum" sz="quarter" idx="10"/>
+          </p:nvPr>
+        </p:nvSpPr>
+        <p:spPr/>
+        <p:txBody>
+          <a:bodyPr/>
+          <a:lstStyle>
+            <a:extLst/>
+          </a:lstStyle>
+          <a:p>
+            <a:fld id="{B3A019F3-8596-4028-9847-CBD3A185B07A}" type="slidenum">
+              <a:rPr lang="en-US" smtClean="0"/>
+              <a:pPr/>
+              <a:t>17</a:t>
+            </a:fld>
+            <a:endParaRPr lang="en-US"/>
+          </a:p>
+        </p:txBody>
+      </p:sp>
+    </p:spTree>
+  </p:cSld>
+  <p:clrMapOvr>
+    <a:masterClrMapping/>
+  </p:clrMapOvr>
+</p:notes>
+</file>
+
+<file path=ppt/notesSlides/notesSlide18.xml><?xml version="1.0" encoding="utf-8"?>
+<p:notes xmlns:a="http://schemas.openxmlformats.org/drawingml/2006/main" xmlns:r="http://schemas.openxmlformats.org/officeDocument/2006/relationships" xmlns:p="http://schemas.openxmlformats.org/presentationml/2006/main">
+  <p:cSld>
+    <p:spTree>
+      <p:nvGrpSpPr>
+        <p:cNvPr id="1" name=""/>
+        <p:cNvGrpSpPr/>
+        <p:nvPr/>
+      </p:nvGrpSpPr>
+      <p:grpSpPr>
+        <a:xfrm>
+          <a:off x="0" y="0"/>
+          <a:ext cx="0" cy="0"/>
+          <a:chOff x="0" y="0"/>
+          <a:chExt cx="0" cy="0"/>
+        </a:xfrm>
+      </p:grpSpPr>
+      <p:sp>
+        <p:nvSpPr>
+          <p:cNvPr id="2" name="Rectangle 2"/>
+          <p:cNvSpPr>
+            <a:spLocks noGrp="1" noRot="1" noChangeAspect="1"/>
+          </p:cNvSpPr>
+          <p:nvPr>
+            <p:ph type="sldImg"/>
+          </p:nvPr>
+        </p:nvSpPr>
+        <p:spPr/>
+      </p:sp>
+      <p:sp>
+        <p:nvSpPr>
+          <p:cNvPr id="3" name="Rectangle 3"/>
+          <p:cNvSpPr>
+            <a:spLocks noGrp="1"/>
+          </p:cNvSpPr>
+          <p:nvPr>
+            <p:ph type="body" idx="1"/>
+          </p:nvPr>
+        </p:nvSpPr>
+        <p:spPr/>
+        <p:txBody>
+          <a:bodyPr/>
+          <a:lstStyle>
+            <a:extLst/>
+          </a:lstStyle>
+          <a:p>
+            <a:endParaRPr lang="en-US"/>
+          </a:p>
+        </p:txBody>
+      </p:sp>
+      <p:sp>
+        <p:nvSpPr>
+          <p:cNvPr id="4" name="Rectangle 4"/>
+          <p:cNvSpPr>
+            <a:spLocks noGrp="1"/>
+          </p:cNvSpPr>
+          <p:nvPr>
+            <p:ph type="sldNum" sz="quarter" idx="10"/>
+          </p:nvPr>
+        </p:nvSpPr>
+        <p:spPr/>
+        <p:txBody>
+          <a:bodyPr/>
+          <a:lstStyle>
+            <a:extLst/>
+          </a:lstStyle>
+          <a:p>
+            <a:fld id="{B3A019F3-8596-4028-9847-CBD3A185B07A}" type="slidenum">
+              <a:rPr lang="en-US" smtClean="0"/>
+              <a:pPr/>
+              <a:t>18</a:t>
+            </a:fld>
+            <a:endParaRPr lang="en-US"/>
+          </a:p>
+        </p:txBody>
+      </p:sp>
+    </p:spTree>
+  </p:cSld>
+  <p:clrMapOvr>
+    <a:masterClrMapping/>
+  </p:clrMapOvr>
+</p:notes>
+</file>
+
+<file path=ppt/notesSlides/notesSlide19.xml><?xml version="1.0" encoding="utf-8"?>
+<p:notes xmlns:a="http://schemas.openxmlformats.org/drawingml/2006/main" xmlns:r="http://schemas.openxmlformats.org/officeDocument/2006/relationships" xmlns:p="http://schemas.openxmlformats.org/presentationml/2006/main">
+  <p:cSld>
+    <p:spTree>
+      <p:nvGrpSpPr>
+        <p:cNvPr id="1" name=""/>
+        <p:cNvGrpSpPr/>
+        <p:nvPr/>
+      </p:nvGrpSpPr>
+      <p:grpSpPr>
+        <a:xfrm>
+          <a:off x="0" y="0"/>
+          <a:ext cx="0" cy="0"/>
+          <a:chOff x="0" y="0"/>
+          <a:chExt cx="0" cy="0"/>
+        </a:xfrm>
+      </p:grpSpPr>
+      <p:sp>
+        <p:nvSpPr>
+          <p:cNvPr id="2" name="Rectangle 2"/>
+          <p:cNvSpPr>
+            <a:spLocks noGrp="1" noRot="1" noChangeAspect="1"/>
+          </p:cNvSpPr>
+          <p:nvPr>
+            <p:ph type="sldImg"/>
+          </p:nvPr>
+        </p:nvSpPr>
+        <p:spPr/>
+      </p:sp>
+      <p:sp>
+        <p:nvSpPr>
+          <p:cNvPr id="3" name="Rectangle 3"/>
+          <p:cNvSpPr>
+            <a:spLocks noGrp="1"/>
+          </p:cNvSpPr>
+          <p:nvPr>
+            <p:ph type="body" idx="1"/>
+          </p:nvPr>
+        </p:nvSpPr>
+        <p:spPr/>
+        <p:txBody>
+          <a:bodyPr/>
+          <a:lstStyle>
+            <a:extLst/>
+          </a:lstStyle>
+          <a:p>
+            <a:endParaRPr lang="en-US"/>
+          </a:p>
+        </p:txBody>
+      </p:sp>
+      <p:sp>
+        <p:nvSpPr>
+          <p:cNvPr id="4" name="Rectangle 4"/>
+          <p:cNvSpPr>
+            <a:spLocks noGrp="1"/>
+          </p:cNvSpPr>
+          <p:nvPr>
+            <p:ph type="sldNum" sz="quarter" idx="10"/>
+          </p:nvPr>
+        </p:nvSpPr>
+        <p:spPr/>
+        <p:txBody>
+          <a:bodyPr/>
+          <a:lstStyle>
+            <a:extLst/>
+          </a:lstStyle>
+          <a:p>
+            <a:fld id="{B3A019F3-8596-4028-9847-CBD3A185B07A}" type="slidenum">
+              <a:rPr lang="en-US" smtClean="0"/>
+              <a:pPr/>
+              <a:t>19</a:t>
             </a:fld>
             <a:endParaRPr lang="en-US"/>
           </a:p>
@@ -10328,6 +10923,1207 @@
     <p:extLst>
       <p:ext uri="{BB962C8B-B14F-4D97-AF65-F5344CB8AC3E}">
         <p14:creationId xmlns:p14="http://schemas.microsoft.com/office/powerpoint/2010/main" val="3476578919"/>
+      </p:ext>
+    </p:extLst>
+  </p:cSld>
+  <p:clrMapOvr>
+    <a:masterClrMapping/>
+  </p:clrMapOvr>
+  <p:timing>
+    <p:tnLst>
+      <p:par>
+        <p:cTn id="1" dur="indefinite" restart="never" nodeType="tmRoot"/>
+      </p:par>
+    </p:tnLst>
+  </p:timing>
+</p:sld>
+</file>
+
+<file path=ppt/slides/slide13.xml><?xml version="1.0" encoding="utf-8"?>
+<p:sld xmlns:a="http://schemas.openxmlformats.org/drawingml/2006/main" xmlns:r="http://schemas.openxmlformats.org/officeDocument/2006/relationships" xmlns:p="http://schemas.openxmlformats.org/presentationml/2006/main">
+  <p:cSld>
+    <p:spTree>
+      <p:nvGrpSpPr>
+        <p:cNvPr id="1" name=""/>
+        <p:cNvGrpSpPr/>
+        <p:nvPr/>
+      </p:nvGrpSpPr>
+      <p:grpSpPr>
+        <a:xfrm>
+          <a:off x="0" y="0"/>
+          <a:ext cx="0" cy="0"/>
+          <a:chOff x="0" y="0"/>
+          <a:chExt cx="0" cy="0"/>
+        </a:xfrm>
+      </p:grpSpPr>
+      <p:sp>
+        <p:nvSpPr>
+          <p:cNvPr id="29" name="Rectangle 2"/>
+          <p:cNvSpPr>
+            <a:spLocks noGrp="1"/>
+          </p:cNvSpPr>
+          <p:nvPr>
+            <p:ph type="title"/>
+          </p:nvPr>
+        </p:nvSpPr>
+        <p:spPr/>
+        <p:txBody>
+          <a:bodyPr>
+            <a:normAutofit fontScale="90000"/>
+          </a:bodyPr>
+          <a:lstStyle>
+            <a:extLst/>
+          </a:lstStyle>
+          <a:p>
+            <a:r>
+              <a:rPr lang="sl-SI" dirty="0" smtClean="0"/>
+              <a:t>Opis simulatorja</a:t>
+            </a:r>
+            <a:endParaRPr lang="en-US" dirty="0"/>
+          </a:p>
+        </p:txBody>
+      </p:sp>
+      <p:sp>
+        <p:nvSpPr>
+          <p:cNvPr id="2" name="Rectangle 3"/>
+          <p:cNvSpPr>
+            <a:spLocks noGrp="1"/>
+          </p:cNvSpPr>
+          <p:nvPr>
+            <p:ph type="body" sz="quarter" idx="13"/>
+          </p:nvPr>
+        </p:nvSpPr>
+        <p:spPr>
+          <a:xfrm>
+            <a:off x="304800" y="381000"/>
+            <a:ext cx="8077200" cy="599728"/>
+          </a:xfrm>
+        </p:spPr>
+        <p:txBody>
+          <a:bodyPr>
+            <a:noAutofit/>
+          </a:bodyPr>
+          <a:lstStyle>
+            <a:extLst/>
+          </a:lstStyle>
+          <a:p>
+            <a:r>
+              <a:rPr lang="sl-SI" sz="3600" dirty="0" smtClean="0"/>
+              <a:t>Zunanje koordinate</a:t>
+            </a:r>
+            <a:endParaRPr lang="en-US" sz="3600" dirty="0"/>
+          </a:p>
+        </p:txBody>
+      </p:sp>
+      <p:pic>
+        <p:nvPicPr>
+          <p:cNvPr id="12" name="Content Placeholder 11"/>
+          <p:cNvPicPr>
+            <a:picLocks noGrp="1" noChangeAspect="1"/>
+          </p:cNvPicPr>
+          <p:nvPr>
+            <p:ph sz="quarter" idx="15"/>
+          </p:nvPr>
+        </p:nvPicPr>
+        <p:blipFill>
+          <a:blip r:embed="rId3" cstate="print">
+            <a:extLst>
+              <a:ext uri="{28A0092B-C50C-407E-A947-70E740481C1C}">
+                <a14:useLocalDpi xmlns:a14="http://schemas.microsoft.com/office/drawing/2010/main" val="0"/>
+              </a:ext>
+            </a:extLst>
+          </a:blip>
+          <a:stretch>
+            <a:fillRect/>
+          </a:stretch>
+        </p:blipFill>
+        <p:spPr>
+          <a:xfrm>
+            <a:off x="6180133" y="5343184"/>
+            <a:ext cx="2352307" cy="1470192"/>
+          </a:xfrm>
+        </p:spPr>
+      </p:pic>
+      <p:sp>
+        <p:nvSpPr>
+          <p:cNvPr id="5" name="Rectangle 4"/>
+          <p:cNvSpPr>
+            <a:spLocks noGrp="1"/>
+          </p:cNvSpPr>
+          <p:nvPr>
+            <p:ph sz="quarter" idx="15"/>
+          </p:nvPr>
+        </p:nvSpPr>
+        <p:spPr>
+          <a:xfrm>
+            <a:off x="323528" y="1052736"/>
+            <a:ext cx="8064896" cy="3024336"/>
+          </a:xfrm>
+        </p:spPr>
+        <p:txBody>
+          <a:bodyPr>
+            <a:normAutofit/>
+          </a:bodyPr>
+          <a:lstStyle>
+            <a:extLst/>
+          </a:lstStyle>
+          <a:p>
+            <a:pPr marL="342900" marR="0" indent="-342900" algn="l" rtl="0" latinLnBrk="0">
+              <a:spcBef>
+                <a:spcPct val="20000"/>
+              </a:spcBef>
+              <a:buFont typeface="Arial" pitchFamily="34" charset="0"/>
+              <a:buChar char="•"/>
+            </a:pPr>
+            <a:r>
+              <a:rPr lang="sl-SI" sz="1800" dirty="0" smtClean="0"/>
+              <a:t>Inverzna kinematika</a:t>
+            </a:r>
+          </a:p>
+          <a:p>
+            <a:pPr marL="342900" marR="0" indent="-342900" algn="l" rtl="0" latinLnBrk="0">
+              <a:spcBef>
+                <a:spcPct val="20000"/>
+              </a:spcBef>
+              <a:buFont typeface="Arial" pitchFamily="34" charset="0"/>
+              <a:buChar char="•"/>
+            </a:pPr>
+            <a:r>
+              <a:rPr lang="sl-SI" sz="1800" dirty="0" smtClean="0"/>
+              <a:t>Delujoča rešitev v </a:t>
+            </a:r>
+            <a:r>
+              <a:rPr lang="sl-SI" sz="1800" dirty="0" err="1" smtClean="0"/>
+              <a:t>JRobSim</a:t>
+            </a:r>
+            <a:r>
+              <a:rPr lang="sl-SI" sz="1800" dirty="0"/>
+              <a:t> </a:t>
+            </a:r>
+            <a:r>
+              <a:rPr lang="sl-SI" sz="1800" dirty="0" smtClean="0"/>
+              <a:t>vendar</a:t>
+            </a:r>
+          </a:p>
+          <a:p>
+            <a:pPr marL="1085850" lvl="1" indent="-342900">
+              <a:buFont typeface="Arial" pitchFamily="34" charset="0"/>
+              <a:buChar char="•"/>
+            </a:pPr>
+            <a:r>
+              <a:rPr lang="sl-SI" sz="1800" dirty="0" smtClean="0"/>
+              <a:t>Nepreglednost kode</a:t>
+            </a:r>
+          </a:p>
+          <a:p>
+            <a:pPr marL="1085850" lvl="1" indent="-342900">
+              <a:buFont typeface="Arial" pitchFamily="34" charset="0"/>
+              <a:buChar char="•"/>
+            </a:pPr>
+            <a:r>
+              <a:rPr lang="sl-SI" sz="1800" dirty="0" smtClean="0"/>
+              <a:t>Pomanjkanje komentarjev</a:t>
+            </a:r>
+          </a:p>
+          <a:p>
+            <a:pPr marL="342900" indent="-342900">
+              <a:buFont typeface="Arial" pitchFamily="34" charset="0"/>
+              <a:buChar char="•"/>
+            </a:pPr>
+            <a:r>
+              <a:rPr lang="sl-SI" sz="1800" dirty="0" smtClean="0"/>
+              <a:t>Ni implementirano do konca</a:t>
+            </a:r>
+          </a:p>
+        </p:txBody>
+      </p:sp>
+      <p:pic>
+        <p:nvPicPr>
+          <p:cNvPr id="3" name="Picture 2"/>
+          <p:cNvPicPr>
+            <a:picLocks noChangeAspect="1"/>
+          </p:cNvPicPr>
+          <p:nvPr/>
+        </p:nvPicPr>
+        <p:blipFill>
+          <a:blip r:embed="rId4">
+            <a:extLst>
+              <a:ext uri="{28A0092B-C50C-407E-A947-70E740481C1C}">
+                <a14:useLocalDpi xmlns:a14="http://schemas.microsoft.com/office/drawing/2010/main" val="0"/>
+              </a:ext>
+            </a:extLst>
+          </a:blip>
+          <a:stretch>
+            <a:fillRect/>
+          </a:stretch>
+        </p:blipFill>
+        <p:spPr>
+          <a:xfrm>
+            <a:off x="1763688" y="3068960"/>
+            <a:ext cx="5472608" cy="3351891"/>
+          </a:xfrm>
+          <a:prstGeom prst="rect">
+            <a:avLst/>
+          </a:prstGeom>
+        </p:spPr>
+      </p:pic>
+    </p:spTree>
+    <p:extLst>
+      <p:ext uri="{BB962C8B-B14F-4D97-AF65-F5344CB8AC3E}">
+        <p14:creationId xmlns:p14="http://schemas.microsoft.com/office/powerpoint/2010/main" val="2163476979"/>
+      </p:ext>
+    </p:extLst>
+  </p:cSld>
+  <p:clrMapOvr>
+    <a:masterClrMapping/>
+  </p:clrMapOvr>
+  <p:timing>
+    <p:tnLst>
+      <p:par>
+        <p:cTn id="1" dur="indefinite" restart="never" nodeType="tmRoot"/>
+      </p:par>
+    </p:tnLst>
+  </p:timing>
+</p:sld>
+</file>
+
+<file path=ppt/slides/slide14.xml><?xml version="1.0" encoding="utf-8"?>
+<p:sld xmlns:a="http://schemas.openxmlformats.org/drawingml/2006/main" xmlns:r="http://schemas.openxmlformats.org/officeDocument/2006/relationships" xmlns:p="http://schemas.openxmlformats.org/presentationml/2006/main">
+  <p:cSld>
+    <p:spTree>
+      <p:nvGrpSpPr>
+        <p:cNvPr id="1" name=""/>
+        <p:cNvGrpSpPr/>
+        <p:nvPr/>
+      </p:nvGrpSpPr>
+      <p:grpSpPr>
+        <a:xfrm>
+          <a:off x="0" y="0"/>
+          <a:ext cx="0" cy="0"/>
+          <a:chOff x="0" y="0"/>
+          <a:chExt cx="0" cy="0"/>
+        </a:xfrm>
+      </p:grpSpPr>
+      <p:sp>
+        <p:nvSpPr>
+          <p:cNvPr id="3" name="Rectangle 2"/>
+          <p:cNvSpPr>
+            <a:spLocks noGrp="1"/>
+          </p:cNvSpPr>
+          <p:nvPr>
+            <p:ph type="ctrTitle"/>
+          </p:nvPr>
+        </p:nvSpPr>
+        <p:spPr/>
+        <p:txBody>
+          <a:bodyPr/>
+          <a:lstStyle>
+            <a:extLst/>
+          </a:lstStyle>
+          <a:p>
+            <a:r>
+              <a:rPr lang="sl-SI" dirty="0"/>
+              <a:t>4</a:t>
+            </a:r>
+            <a:r>
+              <a:rPr lang="sl-SI" dirty="0" smtClean="0"/>
+              <a:t>. </a:t>
+            </a:r>
+            <a:r>
+              <a:rPr lang="sl-SI" dirty="0" smtClean="0"/>
+              <a:t>Predstavitev simulatorja</a:t>
+            </a:r>
+            <a:endParaRPr lang="en-US" dirty="0"/>
+          </a:p>
+        </p:txBody>
+      </p:sp>
+      <p:pic>
+        <p:nvPicPr>
+          <p:cNvPr id="4" name="Content Placeholder 11"/>
+          <p:cNvPicPr>
+            <a:picLocks noChangeAspect="1"/>
+          </p:cNvPicPr>
+          <p:nvPr/>
+        </p:nvPicPr>
+        <p:blipFill>
+          <a:blip r:embed="rId3" cstate="print">
+            <a:extLst>
+              <a:ext uri="{28A0092B-C50C-407E-A947-70E740481C1C}">
+                <a14:useLocalDpi xmlns:a14="http://schemas.microsoft.com/office/drawing/2010/main" val="0"/>
+              </a:ext>
+            </a:extLst>
+          </a:blip>
+          <a:stretch>
+            <a:fillRect/>
+          </a:stretch>
+        </p:blipFill>
+        <p:spPr>
+          <a:xfrm>
+            <a:off x="6660232" y="5301208"/>
+            <a:ext cx="2352307" cy="1470192"/>
+          </a:xfrm>
+          <a:prstGeom prst="rect">
+            <a:avLst/>
+          </a:prstGeom>
+        </p:spPr>
+      </p:pic>
+      <p:pic>
+        <p:nvPicPr>
+          <p:cNvPr id="5" name="Picture 4"/>
+          <p:cNvPicPr>
+            <a:picLocks noChangeAspect="1"/>
+          </p:cNvPicPr>
+          <p:nvPr/>
+        </p:nvPicPr>
+        <p:blipFill>
+          <a:blip r:embed="rId4">
+            <a:extLst>
+              <a:ext uri="{28A0092B-C50C-407E-A947-70E740481C1C}">
+                <a14:useLocalDpi xmlns:a14="http://schemas.microsoft.com/office/drawing/2010/main" val="0"/>
+              </a:ext>
+            </a:extLst>
+          </a:blip>
+          <a:stretch>
+            <a:fillRect/>
+          </a:stretch>
+        </p:blipFill>
+        <p:spPr>
+          <a:xfrm>
+            <a:off x="1835696" y="260648"/>
+            <a:ext cx="5268055" cy="3451484"/>
+          </a:xfrm>
+          <a:prstGeom prst="rect">
+            <a:avLst/>
+          </a:prstGeom>
+        </p:spPr>
+      </p:pic>
+    </p:spTree>
+    <p:extLst>
+      <p:ext uri="{BB962C8B-B14F-4D97-AF65-F5344CB8AC3E}">
+        <p14:creationId xmlns:p14="http://schemas.microsoft.com/office/powerpoint/2010/main" val="3276361756"/>
+      </p:ext>
+    </p:extLst>
+  </p:cSld>
+  <p:clrMapOvr>
+    <a:masterClrMapping/>
+  </p:clrMapOvr>
+  <p:timing>
+    <p:tnLst>
+      <p:par>
+        <p:cTn id="1" dur="indefinite" restart="never" nodeType="tmRoot"/>
+      </p:par>
+    </p:tnLst>
+  </p:timing>
+</p:sld>
+</file>
+
+<file path=ppt/slides/slide15.xml><?xml version="1.0" encoding="utf-8"?>
+<p:sld xmlns:a="http://schemas.openxmlformats.org/drawingml/2006/main" xmlns:r="http://schemas.openxmlformats.org/officeDocument/2006/relationships" xmlns:p="http://schemas.openxmlformats.org/presentationml/2006/main">
+  <p:cSld>
+    <p:spTree>
+      <p:nvGrpSpPr>
+        <p:cNvPr id="1" name=""/>
+        <p:cNvGrpSpPr/>
+        <p:nvPr/>
+      </p:nvGrpSpPr>
+      <p:grpSpPr>
+        <a:xfrm>
+          <a:off x="0" y="0"/>
+          <a:ext cx="0" cy="0"/>
+          <a:chOff x="0" y="0"/>
+          <a:chExt cx="0" cy="0"/>
+        </a:xfrm>
+      </p:grpSpPr>
+      <p:sp>
+        <p:nvSpPr>
+          <p:cNvPr id="29" name="Rectangle 2"/>
+          <p:cNvSpPr>
+            <a:spLocks noGrp="1"/>
+          </p:cNvSpPr>
+          <p:nvPr>
+            <p:ph type="title"/>
+          </p:nvPr>
+        </p:nvSpPr>
+        <p:spPr/>
+        <p:txBody>
+          <a:bodyPr>
+            <a:normAutofit fontScale="90000"/>
+          </a:bodyPr>
+          <a:lstStyle>
+            <a:extLst/>
+          </a:lstStyle>
+          <a:p>
+            <a:r>
+              <a:rPr lang="sl-SI" dirty="0" smtClean="0"/>
+              <a:t>Predstavitev</a:t>
+            </a:r>
+            <a:r>
+              <a:rPr lang="sl-SI" dirty="0" smtClean="0"/>
+              <a:t> simulatorja</a:t>
+            </a:r>
+            <a:endParaRPr lang="en-US" dirty="0"/>
+          </a:p>
+        </p:txBody>
+      </p:sp>
+      <p:sp>
+        <p:nvSpPr>
+          <p:cNvPr id="2" name="Rectangle 3"/>
+          <p:cNvSpPr>
+            <a:spLocks noGrp="1"/>
+          </p:cNvSpPr>
+          <p:nvPr>
+            <p:ph type="body" sz="quarter" idx="13"/>
+          </p:nvPr>
+        </p:nvSpPr>
+        <p:spPr>
+          <a:xfrm>
+            <a:off x="304800" y="381000"/>
+            <a:ext cx="8077200" cy="599728"/>
+          </a:xfrm>
+        </p:spPr>
+        <p:txBody>
+          <a:bodyPr>
+            <a:noAutofit/>
+          </a:bodyPr>
+          <a:lstStyle>
+            <a:extLst/>
+          </a:lstStyle>
+          <a:p>
+            <a:r>
+              <a:rPr lang="sl-SI" sz="3600" dirty="0" err="1" smtClean="0"/>
+              <a:t>Live</a:t>
+            </a:r>
+            <a:r>
+              <a:rPr lang="sl-SI" sz="3600" dirty="0" smtClean="0"/>
+              <a:t> demo</a:t>
+            </a:r>
+            <a:endParaRPr lang="en-US" sz="3600" dirty="0"/>
+          </a:p>
+        </p:txBody>
+      </p:sp>
+      <p:pic>
+        <p:nvPicPr>
+          <p:cNvPr id="12" name="Content Placeholder 11"/>
+          <p:cNvPicPr>
+            <a:picLocks noGrp="1" noChangeAspect="1"/>
+          </p:cNvPicPr>
+          <p:nvPr>
+            <p:ph sz="quarter" idx="15"/>
+          </p:nvPr>
+        </p:nvPicPr>
+        <p:blipFill>
+          <a:blip r:embed="rId3" cstate="print">
+            <a:extLst>
+              <a:ext uri="{28A0092B-C50C-407E-A947-70E740481C1C}">
+                <a14:useLocalDpi xmlns:a14="http://schemas.microsoft.com/office/drawing/2010/main" val="0"/>
+              </a:ext>
+            </a:extLst>
+          </a:blip>
+          <a:stretch>
+            <a:fillRect/>
+          </a:stretch>
+        </p:blipFill>
+        <p:spPr>
+          <a:xfrm>
+            <a:off x="6180133" y="5343184"/>
+            <a:ext cx="2352307" cy="1470192"/>
+          </a:xfrm>
+        </p:spPr>
+      </p:pic>
+      <p:sp>
+        <p:nvSpPr>
+          <p:cNvPr id="4" name="TextBox 3"/>
+          <p:cNvSpPr txBox="1"/>
+          <p:nvPr/>
+        </p:nvSpPr>
+        <p:spPr>
+          <a:xfrm>
+            <a:off x="3744148" y="3635732"/>
+            <a:ext cx="1043876" cy="369332"/>
+          </a:xfrm>
+          <a:prstGeom prst="rect">
+            <a:avLst/>
+          </a:prstGeom>
+          <a:noFill/>
+        </p:spPr>
+        <p:txBody>
+          <a:bodyPr wrap="none" rtlCol="0">
+            <a:spAutoFit/>
+          </a:bodyPr>
+          <a:lstStyle/>
+          <a:p>
+            <a:r>
+              <a:rPr lang="sl-SI" dirty="0" err="1" smtClean="0">
+                <a:hlinkClick r:id="rId4" action="ppaction://program"/>
+              </a:rPr>
+              <a:t>Click</a:t>
+            </a:r>
+            <a:r>
+              <a:rPr lang="sl-SI" dirty="0" smtClean="0">
+                <a:hlinkClick r:id="rId4" action="ppaction://program"/>
+              </a:rPr>
+              <a:t> me!</a:t>
+            </a:r>
+            <a:endParaRPr lang="sl-SI" dirty="0"/>
+          </a:p>
+        </p:txBody>
+      </p:sp>
+    </p:spTree>
+    <p:extLst>
+      <p:ext uri="{BB962C8B-B14F-4D97-AF65-F5344CB8AC3E}">
+        <p14:creationId xmlns:p14="http://schemas.microsoft.com/office/powerpoint/2010/main" val="128387459"/>
+      </p:ext>
+    </p:extLst>
+  </p:cSld>
+  <p:clrMapOvr>
+    <a:masterClrMapping/>
+  </p:clrMapOvr>
+  <p:timing>
+    <p:tnLst>
+      <p:par>
+        <p:cTn id="1" dur="indefinite" restart="never" nodeType="tmRoot"/>
+      </p:par>
+    </p:tnLst>
+  </p:timing>
+</p:sld>
+</file>
+
+<file path=ppt/slides/slide16.xml><?xml version="1.0" encoding="utf-8"?>
+<p:sld xmlns:a="http://schemas.openxmlformats.org/drawingml/2006/main" xmlns:r="http://schemas.openxmlformats.org/officeDocument/2006/relationships" xmlns:p="http://schemas.openxmlformats.org/presentationml/2006/main">
+  <p:cSld>
+    <p:spTree>
+      <p:nvGrpSpPr>
+        <p:cNvPr id="1" name=""/>
+        <p:cNvGrpSpPr/>
+        <p:nvPr/>
+      </p:nvGrpSpPr>
+      <p:grpSpPr>
+        <a:xfrm>
+          <a:off x="0" y="0"/>
+          <a:ext cx="0" cy="0"/>
+          <a:chOff x="0" y="0"/>
+          <a:chExt cx="0" cy="0"/>
+        </a:xfrm>
+      </p:grpSpPr>
+      <p:sp>
+        <p:nvSpPr>
+          <p:cNvPr id="3" name="Rectangle 2"/>
+          <p:cNvSpPr>
+            <a:spLocks noGrp="1"/>
+          </p:cNvSpPr>
+          <p:nvPr>
+            <p:ph type="ctrTitle"/>
+          </p:nvPr>
+        </p:nvSpPr>
+        <p:spPr/>
+        <p:txBody>
+          <a:bodyPr/>
+          <a:lstStyle>
+            <a:extLst/>
+          </a:lstStyle>
+          <a:p>
+            <a:r>
+              <a:rPr lang="sl-SI" dirty="0" smtClean="0"/>
+              <a:t>5. </a:t>
+            </a:r>
+            <a:r>
+              <a:rPr lang="sl-SI" dirty="0" smtClean="0"/>
+              <a:t>Zaključek</a:t>
+            </a:r>
+            <a:endParaRPr lang="en-US" dirty="0"/>
+          </a:p>
+        </p:txBody>
+      </p:sp>
+      <p:pic>
+        <p:nvPicPr>
+          <p:cNvPr id="4" name="Content Placeholder 11"/>
+          <p:cNvPicPr>
+            <a:picLocks noChangeAspect="1"/>
+          </p:cNvPicPr>
+          <p:nvPr/>
+        </p:nvPicPr>
+        <p:blipFill>
+          <a:blip r:embed="rId3" cstate="print">
+            <a:extLst>
+              <a:ext uri="{28A0092B-C50C-407E-A947-70E740481C1C}">
+                <a14:useLocalDpi xmlns:a14="http://schemas.microsoft.com/office/drawing/2010/main" val="0"/>
+              </a:ext>
+            </a:extLst>
+          </a:blip>
+          <a:stretch>
+            <a:fillRect/>
+          </a:stretch>
+        </p:blipFill>
+        <p:spPr>
+          <a:xfrm>
+            <a:off x="6660232" y="5301208"/>
+            <a:ext cx="2352307" cy="1470192"/>
+          </a:xfrm>
+          <a:prstGeom prst="rect">
+            <a:avLst/>
+          </a:prstGeom>
+        </p:spPr>
+      </p:pic>
+      <p:pic>
+        <p:nvPicPr>
+          <p:cNvPr id="2" name="Picture 1"/>
+          <p:cNvPicPr>
+            <a:picLocks noChangeAspect="1"/>
+          </p:cNvPicPr>
+          <p:nvPr/>
+        </p:nvPicPr>
+        <p:blipFill>
+          <a:blip r:embed="rId4" cstate="print">
+            <a:extLst>
+              <a:ext uri="{28A0092B-C50C-407E-A947-70E740481C1C}">
+                <a14:useLocalDpi xmlns:a14="http://schemas.microsoft.com/office/drawing/2010/main" val="0"/>
+              </a:ext>
+            </a:extLst>
+          </a:blip>
+          <a:stretch>
+            <a:fillRect/>
+          </a:stretch>
+        </p:blipFill>
+        <p:spPr>
+          <a:xfrm>
+            <a:off x="1043608" y="404664"/>
+            <a:ext cx="7199784" cy="3130341"/>
+          </a:xfrm>
+          <a:prstGeom prst="rect">
+            <a:avLst/>
+          </a:prstGeom>
+        </p:spPr>
+      </p:pic>
+    </p:spTree>
+    <p:extLst>
+      <p:ext uri="{BB962C8B-B14F-4D97-AF65-F5344CB8AC3E}">
+        <p14:creationId xmlns:p14="http://schemas.microsoft.com/office/powerpoint/2010/main" val="4156959742"/>
+      </p:ext>
+    </p:extLst>
+  </p:cSld>
+  <p:clrMapOvr>
+    <a:masterClrMapping/>
+  </p:clrMapOvr>
+  <p:timing>
+    <p:tnLst>
+      <p:par>
+        <p:cTn id="1" dur="indefinite" restart="never" nodeType="tmRoot"/>
+      </p:par>
+    </p:tnLst>
+  </p:timing>
+</p:sld>
+</file>
+
+<file path=ppt/slides/slide17.xml><?xml version="1.0" encoding="utf-8"?>
+<p:sld xmlns:a="http://schemas.openxmlformats.org/drawingml/2006/main" xmlns:r="http://schemas.openxmlformats.org/officeDocument/2006/relationships" xmlns:p="http://schemas.openxmlformats.org/presentationml/2006/main">
+  <p:cSld>
+    <p:spTree>
+      <p:nvGrpSpPr>
+        <p:cNvPr id="1" name=""/>
+        <p:cNvGrpSpPr/>
+        <p:nvPr/>
+      </p:nvGrpSpPr>
+      <p:grpSpPr>
+        <a:xfrm>
+          <a:off x="0" y="0"/>
+          <a:ext cx="0" cy="0"/>
+          <a:chOff x="0" y="0"/>
+          <a:chExt cx="0" cy="0"/>
+        </a:xfrm>
+      </p:grpSpPr>
+      <p:sp>
+        <p:nvSpPr>
+          <p:cNvPr id="29" name="Rectangle 2"/>
+          <p:cNvSpPr>
+            <a:spLocks noGrp="1"/>
+          </p:cNvSpPr>
+          <p:nvPr>
+            <p:ph type="title"/>
+          </p:nvPr>
+        </p:nvSpPr>
+        <p:spPr/>
+        <p:txBody>
+          <a:bodyPr>
+            <a:normAutofit fontScale="90000"/>
+          </a:bodyPr>
+          <a:lstStyle>
+            <a:extLst/>
+          </a:lstStyle>
+          <a:p>
+            <a:r>
+              <a:rPr lang="sl-SI" dirty="0" smtClean="0"/>
+              <a:t>Zaključek</a:t>
+            </a:r>
+            <a:endParaRPr lang="en-US" dirty="0"/>
+          </a:p>
+        </p:txBody>
+      </p:sp>
+      <p:sp>
+        <p:nvSpPr>
+          <p:cNvPr id="2" name="Rectangle 3"/>
+          <p:cNvSpPr>
+            <a:spLocks noGrp="1"/>
+          </p:cNvSpPr>
+          <p:nvPr>
+            <p:ph type="body" sz="quarter" idx="13"/>
+          </p:nvPr>
+        </p:nvSpPr>
+        <p:spPr>
+          <a:xfrm>
+            <a:off x="304800" y="381000"/>
+            <a:ext cx="8077200" cy="599728"/>
+          </a:xfrm>
+        </p:spPr>
+        <p:txBody>
+          <a:bodyPr>
+            <a:noAutofit/>
+          </a:bodyPr>
+          <a:lstStyle>
+            <a:extLst/>
+          </a:lstStyle>
+          <a:p>
+            <a:r>
+              <a:rPr lang="sl-SI" sz="3600" dirty="0" smtClean="0"/>
+              <a:t>Kaj smo uspeli narediti</a:t>
+            </a:r>
+            <a:endParaRPr lang="en-US" sz="3600" dirty="0"/>
+          </a:p>
+        </p:txBody>
+      </p:sp>
+      <p:pic>
+        <p:nvPicPr>
+          <p:cNvPr id="12" name="Content Placeholder 11"/>
+          <p:cNvPicPr>
+            <a:picLocks noGrp="1" noChangeAspect="1"/>
+          </p:cNvPicPr>
+          <p:nvPr>
+            <p:ph sz="quarter" idx="15"/>
+          </p:nvPr>
+        </p:nvPicPr>
+        <p:blipFill>
+          <a:blip r:embed="rId3" cstate="print">
+            <a:extLst>
+              <a:ext uri="{28A0092B-C50C-407E-A947-70E740481C1C}">
+                <a14:useLocalDpi xmlns:a14="http://schemas.microsoft.com/office/drawing/2010/main" val="0"/>
+              </a:ext>
+            </a:extLst>
+          </a:blip>
+          <a:stretch>
+            <a:fillRect/>
+          </a:stretch>
+        </p:blipFill>
+        <p:spPr>
+          <a:xfrm>
+            <a:off x="6180133" y="5343184"/>
+            <a:ext cx="2352307" cy="1470192"/>
+          </a:xfrm>
+        </p:spPr>
+      </p:pic>
+      <p:sp>
+        <p:nvSpPr>
+          <p:cNvPr id="6" name="Rectangle 4"/>
+          <p:cNvSpPr>
+            <a:spLocks noGrp="1"/>
+          </p:cNvSpPr>
+          <p:nvPr>
+            <p:ph sz="quarter" idx="15"/>
+          </p:nvPr>
+        </p:nvSpPr>
+        <p:spPr>
+          <a:xfrm>
+            <a:off x="323528" y="1052736"/>
+            <a:ext cx="8064896" cy="3024336"/>
+          </a:xfrm>
+        </p:spPr>
+        <p:txBody>
+          <a:bodyPr>
+            <a:normAutofit/>
+          </a:bodyPr>
+          <a:lstStyle>
+            <a:extLst/>
+          </a:lstStyle>
+          <a:p>
+            <a:pPr marL="342900" marR="0" indent="-342900" algn="l" rtl="0" latinLnBrk="0">
+              <a:spcBef>
+                <a:spcPct val="20000"/>
+              </a:spcBef>
+              <a:buFont typeface="Arial" pitchFamily="34" charset="0"/>
+              <a:buChar char="•"/>
+            </a:pPr>
+            <a:r>
+              <a:rPr lang="sl-SI" sz="1800" dirty="0" smtClean="0"/>
+              <a:t>Celoten uporabniški vmesnik</a:t>
+            </a:r>
+          </a:p>
+          <a:p>
+            <a:pPr marL="342900" marR="0" indent="-342900" algn="l" rtl="0" latinLnBrk="0">
+              <a:spcBef>
+                <a:spcPct val="20000"/>
+              </a:spcBef>
+              <a:buFont typeface="Arial" pitchFamily="34" charset="0"/>
+              <a:buChar char="•"/>
+            </a:pPr>
+            <a:r>
+              <a:rPr lang="sl-SI" sz="1800" dirty="0" smtClean="0"/>
+              <a:t>Rezkar, skupaj z izvozom datotek</a:t>
+            </a:r>
+          </a:p>
+          <a:p>
+            <a:pPr marL="342900" marR="0" indent="-342900" algn="l" rtl="0" latinLnBrk="0">
+              <a:spcBef>
+                <a:spcPct val="20000"/>
+              </a:spcBef>
+              <a:buFont typeface="Arial" pitchFamily="34" charset="0"/>
+              <a:buChar char="•"/>
+            </a:pPr>
+            <a:r>
+              <a:rPr lang="sl-SI" sz="1800" dirty="0" smtClean="0"/>
+              <a:t>Popolnoma funkcionalen model robota </a:t>
+            </a:r>
+            <a:r>
+              <a:rPr lang="sl-SI" sz="1800" dirty="0" err="1" smtClean="0"/>
+              <a:t>Motoman</a:t>
+            </a:r>
+            <a:r>
+              <a:rPr lang="sl-SI" sz="1800" dirty="0" smtClean="0"/>
+              <a:t> MH6</a:t>
+            </a:r>
+          </a:p>
+          <a:p>
+            <a:pPr marL="342900" marR="0" indent="-342900" algn="l" rtl="0" latinLnBrk="0">
+              <a:spcBef>
+                <a:spcPct val="20000"/>
+              </a:spcBef>
+              <a:buFont typeface="Arial" pitchFamily="34" charset="0"/>
+              <a:buChar char="•"/>
+            </a:pPr>
+            <a:r>
+              <a:rPr lang="sl-SI" sz="1800" dirty="0" smtClean="0"/>
+              <a:t>Implementacija jezika robota</a:t>
+            </a:r>
+          </a:p>
+          <a:p>
+            <a:pPr marL="342900" marR="0" indent="-342900" algn="l" rtl="0" latinLnBrk="0">
+              <a:spcBef>
+                <a:spcPct val="20000"/>
+              </a:spcBef>
+              <a:buFont typeface="Arial" pitchFamily="34" charset="0"/>
+              <a:buChar char="•"/>
+            </a:pPr>
+            <a:r>
+              <a:rPr lang="sl-SI" sz="1800" dirty="0" smtClean="0"/>
+              <a:t>Veliko ostalih dodatkov, ki olajšajo uporabo programa (premikanje robota s tipkami itd.)</a:t>
+            </a:r>
+          </a:p>
+          <a:p>
+            <a:pPr marL="342900" marR="0" indent="-342900" algn="l" rtl="0" latinLnBrk="0">
+              <a:spcBef>
+                <a:spcPct val="20000"/>
+              </a:spcBef>
+              <a:buFont typeface="Arial" pitchFamily="34" charset="0"/>
+              <a:buChar char="•"/>
+            </a:pPr>
+            <a:endParaRPr lang="sl-SI" sz="1800" dirty="0" smtClean="0"/>
+          </a:p>
+        </p:txBody>
+      </p:sp>
+    </p:spTree>
+    <p:extLst>
+      <p:ext uri="{BB962C8B-B14F-4D97-AF65-F5344CB8AC3E}">
+        <p14:creationId xmlns:p14="http://schemas.microsoft.com/office/powerpoint/2010/main" val="372977730"/>
+      </p:ext>
+    </p:extLst>
+  </p:cSld>
+  <p:clrMapOvr>
+    <a:masterClrMapping/>
+  </p:clrMapOvr>
+  <p:timing>
+    <p:tnLst>
+      <p:par>
+        <p:cTn id="1" dur="indefinite" restart="never" nodeType="tmRoot"/>
+      </p:par>
+    </p:tnLst>
+  </p:timing>
+</p:sld>
+</file>
+
+<file path=ppt/slides/slide18.xml><?xml version="1.0" encoding="utf-8"?>
+<p:sld xmlns:a="http://schemas.openxmlformats.org/drawingml/2006/main" xmlns:r="http://schemas.openxmlformats.org/officeDocument/2006/relationships" xmlns:p="http://schemas.openxmlformats.org/presentationml/2006/main">
+  <p:cSld>
+    <p:spTree>
+      <p:nvGrpSpPr>
+        <p:cNvPr id="1" name=""/>
+        <p:cNvGrpSpPr/>
+        <p:nvPr/>
+      </p:nvGrpSpPr>
+      <p:grpSpPr>
+        <a:xfrm>
+          <a:off x="0" y="0"/>
+          <a:ext cx="0" cy="0"/>
+          <a:chOff x="0" y="0"/>
+          <a:chExt cx="0" cy="0"/>
+        </a:xfrm>
+      </p:grpSpPr>
+      <p:sp>
+        <p:nvSpPr>
+          <p:cNvPr id="29" name="Rectangle 2"/>
+          <p:cNvSpPr>
+            <a:spLocks noGrp="1"/>
+          </p:cNvSpPr>
+          <p:nvPr>
+            <p:ph type="title"/>
+          </p:nvPr>
+        </p:nvSpPr>
+        <p:spPr/>
+        <p:txBody>
+          <a:bodyPr>
+            <a:normAutofit fontScale="90000"/>
+          </a:bodyPr>
+          <a:lstStyle>
+            <a:extLst/>
+          </a:lstStyle>
+          <a:p>
+            <a:r>
+              <a:rPr lang="sl-SI" dirty="0" smtClean="0"/>
+              <a:t>Zaključek</a:t>
+            </a:r>
+            <a:endParaRPr lang="en-US" dirty="0"/>
+          </a:p>
+        </p:txBody>
+      </p:sp>
+      <p:sp>
+        <p:nvSpPr>
+          <p:cNvPr id="2" name="Rectangle 3"/>
+          <p:cNvSpPr>
+            <a:spLocks noGrp="1"/>
+          </p:cNvSpPr>
+          <p:nvPr>
+            <p:ph type="body" sz="quarter" idx="13"/>
+          </p:nvPr>
+        </p:nvSpPr>
+        <p:spPr>
+          <a:xfrm>
+            <a:off x="304800" y="381000"/>
+            <a:ext cx="8077200" cy="599728"/>
+          </a:xfrm>
+        </p:spPr>
+        <p:txBody>
+          <a:bodyPr>
+            <a:noAutofit/>
+          </a:bodyPr>
+          <a:lstStyle>
+            <a:extLst/>
+          </a:lstStyle>
+          <a:p>
+            <a:r>
+              <a:rPr lang="sl-SI" sz="3600" dirty="0" smtClean="0"/>
+              <a:t>Kaj nam ni uspelo narediti </a:t>
+            </a:r>
+            <a:r>
+              <a:rPr lang="sl-SI" sz="3600" dirty="0" smtClean="0">
+                <a:sym typeface="Wingdings" pitchFamily="2" charset="2"/>
+              </a:rPr>
+              <a:t></a:t>
+            </a:r>
+            <a:endParaRPr lang="en-US" sz="3600" dirty="0"/>
+          </a:p>
+        </p:txBody>
+      </p:sp>
+      <p:pic>
+        <p:nvPicPr>
+          <p:cNvPr id="12" name="Content Placeholder 11"/>
+          <p:cNvPicPr>
+            <a:picLocks noGrp="1" noChangeAspect="1"/>
+          </p:cNvPicPr>
+          <p:nvPr>
+            <p:ph sz="quarter" idx="15"/>
+          </p:nvPr>
+        </p:nvPicPr>
+        <p:blipFill>
+          <a:blip r:embed="rId3" cstate="print">
+            <a:extLst>
+              <a:ext uri="{28A0092B-C50C-407E-A947-70E740481C1C}">
+                <a14:useLocalDpi xmlns:a14="http://schemas.microsoft.com/office/drawing/2010/main" val="0"/>
+              </a:ext>
+            </a:extLst>
+          </a:blip>
+          <a:stretch>
+            <a:fillRect/>
+          </a:stretch>
+        </p:blipFill>
+        <p:spPr>
+          <a:xfrm>
+            <a:off x="6180133" y="5343184"/>
+            <a:ext cx="2352307" cy="1470192"/>
+          </a:xfrm>
+        </p:spPr>
+      </p:pic>
+      <p:sp>
+        <p:nvSpPr>
+          <p:cNvPr id="6" name="Rectangle 4"/>
+          <p:cNvSpPr>
+            <a:spLocks noGrp="1"/>
+          </p:cNvSpPr>
+          <p:nvPr>
+            <p:ph sz="quarter" idx="15"/>
+          </p:nvPr>
+        </p:nvSpPr>
+        <p:spPr>
+          <a:xfrm>
+            <a:off x="323528" y="1052736"/>
+            <a:ext cx="8064896" cy="3024336"/>
+          </a:xfrm>
+        </p:spPr>
+        <p:txBody>
+          <a:bodyPr>
+            <a:normAutofit/>
+          </a:bodyPr>
+          <a:lstStyle>
+            <a:extLst/>
+          </a:lstStyle>
+          <a:p>
+            <a:pPr marL="342900" marR="0" indent="-342900" algn="l" rtl="0" latinLnBrk="0">
+              <a:spcBef>
+                <a:spcPct val="20000"/>
+              </a:spcBef>
+              <a:buFont typeface="Arial" pitchFamily="34" charset="0"/>
+              <a:buChar char="•"/>
+            </a:pPr>
+            <a:r>
+              <a:rPr lang="sl-SI" sz="1800" dirty="0" smtClean="0"/>
+              <a:t>Inverzno kinematiko</a:t>
+            </a:r>
+          </a:p>
+          <a:p>
+            <a:pPr marL="1085850" lvl="1" indent="-342900">
+              <a:buFont typeface="Arial" pitchFamily="34" charset="0"/>
+              <a:buChar char="•"/>
+            </a:pPr>
+            <a:r>
+              <a:rPr lang="sl-SI" sz="1800" dirty="0" smtClean="0"/>
+              <a:t>V simulatorju se sicer nahaja „</a:t>
+            </a:r>
+            <a:r>
+              <a:rPr lang="sl-SI" sz="1800" dirty="0" err="1" smtClean="0"/>
+              <a:t>kvazi</a:t>
+            </a:r>
+            <a:r>
+              <a:rPr lang="sl-SI" sz="1800" dirty="0" smtClean="0"/>
+              <a:t>“ funkcija za inverzno kinematiko, vendar je nepopolna</a:t>
+            </a:r>
+          </a:p>
+          <a:p>
+            <a:pPr marL="342900" marR="0" indent="-342900" algn="l" rtl="0" latinLnBrk="0">
+              <a:spcBef>
+                <a:spcPct val="20000"/>
+              </a:spcBef>
+              <a:buFont typeface="Arial" pitchFamily="34" charset="0"/>
+              <a:buChar char="•"/>
+            </a:pPr>
+            <a:endParaRPr lang="sl-SI" sz="1800" dirty="0" smtClean="0"/>
+          </a:p>
+        </p:txBody>
+      </p:sp>
+    </p:spTree>
+    <p:extLst>
+      <p:ext uri="{BB962C8B-B14F-4D97-AF65-F5344CB8AC3E}">
+        <p14:creationId xmlns:p14="http://schemas.microsoft.com/office/powerpoint/2010/main" val="1420727278"/>
+      </p:ext>
+    </p:extLst>
+  </p:cSld>
+  <p:clrMapOvr>
+    <a:masterClrMapping/>
+  </p:clrMapOvr>
+  <p:timing>
+    <p:tnLst>
+      <p:par>
+        <p:cTn id="1" dur="indefinite" restart="never" nodeType="tmRoot"/>
+      </p:par>
+    </p:tnLst>
+  </p:timing>
+</p:sld>
+</file>
+
+<file path=ppt/slides/slide19.xml><?xml version="1.0" encoding="utf-8"?>
+<p:sld xmlns:a="http://schemas.openxmlformats.org/drawingml/2006/main" xmlns:r="http://schemas.openxmlformats.org/officeDocument/2006/relationships" xmlns:p="http://schemas.openxmlformats.org/presentationml/2006/main">
+  <p:cSld>
+    <p:spTree>
+      <p:nvGrpSpPr>
+        <p:cNvPr id="1" name=""/>
+        <p:cNvGrpSpPr/>
+        <p:nvPr/>
+      </p:nvGrpSpPr>
+      <p:grpSpPr>
+        <a:xfrm>
+          <a:off x="0" y="0"/>
+          <a:ext cx="0" cy="0"/>
+          <a:chOff x="0" y="0"/>
+          <a:chExt cx="0" cy="0"/>
+        </a:xfrm>
+      </p:grpSpPr>
+      <p:sp>
+        <p:nvSpPr>
+          <p:cNvPr id="3" name="Rectangle 2"/>
+          <p:cNvSpPr>
+            <a:spLocks noGrp="1"/>
+          </p:cNvSpPr>
+          <p:nvPr>
+            <p:ph type="ctrTitle"/>
+          </p:nvPr>
+        </p:nvSpPr>
+        <p:spPr/>
+        <p:txBody>
+          <a:bodyPr/>
+          <a:lstStyle>
+            <a:extLst/>
+          </a:lstStyle>
+          <a:p>
+            <a:r>
+              <a:rPr lang="sl-SI" dirty="0" smtClean="0"/>
+              <a:t>6. </a:t>
+            </a:r>
+            <a:r>
+              <a:rPr lang="sl-SI" dirty="0" smtClean="0"/>
+              <a:t>Vprašanja?</a:t>
+            </a:r>
+            <a:endParaRPr lang="en-US" dirty="0"/>
+          </a:p>
+        </p:txBody>
+      </p:sp>
+      <p:pic>
+        <p:nvPicPr>
+          <p:cNvPr id="4" name="Content Placeholder 11"/>
+          <p:cNvPicPr>
+            <a:picLocks noChangeAspect="1"/>
+          </p:cNvPicPr>
+          <p:nvPr/>
+        </p:nvPicPr>
+        <p:blipFill>
+          <a:blip r:embed="rId3" cstate="print">
+            <a:extLst>
+              <a:ext uri="{28A0092B-C50C-407E-A947-70E740481C1C}">
+                <a14:useLocalDpi xmlns:a14="http://schemas.microsoft.com/office/drawing/2010/main" val="0"/>
+              </a:ext>
+            </a:extLst>
+          </a:blip>
+          <a:stretch>
+            <a:fillRect/>
+          </a:stretch>
+        </p:blipFill>
+        <p:spPr>
+          <a:xfrm>
+            <a:off x="6660232" y="5301208"/>
+            <a:ext cx="2352307" cy="1470192"/>
+          </a:xfrm>
+          <a:prstGeom prst="rect">
+            <a:avLst/>
+          </a:prstGeom>
+        </p:spPr>
+      </p:pic>
+    </p:spTree>
+    <p:extLst>
+      <p:ext uri="{BB962C8B-B14F-4D97-AF65-F5344CB8AC3E}">
+        <p14:creationId xmlns:p14="http://schemas.microsoft.com/office/powerpoint/2010/main" val="2151728665"/>
       </p:ext>
     </p:extLst>
   </p:cSld>

</xml_diff>